<commit_message>
Ideen für die Anforderungen in PowerPoint zusammengefasst
</commit_message>
<xml_diff>
--- a/Bewertungsmatrix.pptx
+++ b/Bewertungsmatrix.pptx
@@ -4,6 +4,9 @@
   <p:sldMasterIdLst>
     <p:sldMasterId id="2147483648" r:id="rId1"/>
   </p:sldMasterIdLst>
+  <p:notesMasterIdLst>
+    <p:notesMasterId r:id="rId22"/>
+  </p:notesMasterIdLst>
   <p:sldIdLst>
     <p:sldId id="256" r:id="rId2"/>
     <p:sldId id="257" r:id="rId3"/>
@@ -15,7 +18,16 @@
     <p:sldId id="263" r:id="rId9"/>
     <p:sldId id="265" r:id="rId10"/>
     <p:sldId id="264" r:id="rId11"/>
-    <p:sldId id="266" r:id="rId12"/>
+    <p:sldId id="275" r:id="rId12"/>
+    <p:sldId id="267" r:id="rId13"/>
+    <p:sldId id="268" r:id="rId14"/>
+    <p:sldId id="272" r:id="rId15"/>
+    <p:sldId id="273" r:id="rId16"/>
+    <p:sldId id="269" r:id="rId17"/>
+    <p:sldId id="270" r:id="rId18"/>
+    <p:sldId id="271" r:id="rId19"/>
+    <p:sldId id="266" r:id="rId20"/>
+    <p:sldId id="274" r:id="rId21"/>
   </p:sldIdLst>
   <p:sldSz cx="12192000" cy="6858000"/>
   <p:notesSz cx="6858000" cy="9144000"/>
@@ -122,6 +134,534 @@
 </p:presentation>
 </file>
 
+<file path=ppt/notesMasters/notesMaster1.xml><?xml version="1.0" encoding="utf-8"?>
+<p:notesMaster xmlns:a="http://schemas.openxmlformats.org/drawingml/2006/main" xmlns:r="http://schemas.openxmlformats.org/officeDocument/2006/relationships" xmlns:p="http://schemas.openxmlformats.org/presentationml/2006/main">
+  <p:cSld>
+    <p:bg>
+      <p:bgRef idx="1001">
+        <a:schemeClr val="bg1"/>
+      </p:bgRef>
+    </p:bg>
+    <p:spTree>
+      <p:nvGrpSpPr>
+        <p:cNvPr id="1" name=""/>
+        <p:cNvGrpSpPr/>
+        <p:nvPr/>
+      </p:nvGrpSpPr>
+      <p:grpSpPr>
+        <a:xfrm>
+          <a:off x="0" y="0"/>
+          <a:ext cx="0" cy="0"/>
+          <a:chOff x="0" y="0"/>
+          <a:chExt cx="0" cy="0"/>
+        </a:xfrm>
+      </p:grpSpPr>
+      <p:sp>
+        <p:nvSpPr>
+          <p:cNvPr id="2" name="Kopfzeilenplatzhalter 1"/>
+          <p:cNvSpPr>
+            <a:spLocks noGrp="1"/>
+          </p:cNvSpPr>
+          <p:nvPr>
+            <p:ph type="hdr" sz="quarter"/>
+          </p:nvPr>
+        </p:nvSpPr>
+        <p:spPr>
+          <a:xfrm>
+            <a:off x="0" y="0"/>
+            <a:ext cx="2971800" cy="458788"/>
+          </a:xfrm>
+          <a:prstGeom prst="rect">
+            <a:avLst/>
+          </a:prstGeom>
+        </p:spPr>
+        <p:txBody>
+          <a:bodyPr vert="horz" lIns="91440" tIns="45720" rIns="91440" bIns="45720" rtlCol="0"/>
+          <a:lstStyle>
+            <a:lvl1pPr algn="l">
+              <a:defRPr sz="1200"/>
+            </a:lvl1pPr>
+          </a:lstStyle>
+          <a:p>
+            <a:endParaRPr lang="de-DE"/>
+          </a:p>
+        </p:txBody>
+      </p:sp>
+      <p:sp>
+        <p:nvSpPr>
+          <p:cNvPr id="3" name="Datumsplatzhalter 2"/>
+          <p:cNvSpPr>
+            <a:spLocks noGrp="1"/>
+          </p:cNvSpPr>
+          <p:nvPr>
+            <p:ph type="dt" idx="1"/>
+          </p:nvPr>
+        </p:nvSpPr>
+        <p:spPr>
+          <a:xfrm>
+            <a:off x="3884613" y="0"/>
+            <a:ext cx="2971800" cy="458788"/>
+          </a:xfrm>
+          <a:prstGeom prst="rect">
+            <a:avLst/>
+          </a:prstGeom>
+        </p:spPr>
+        <p:txBody>
+          <a:bodyPr vert="horz" lIns="91440" tIns="45720" rIns="91440" bIns="45720" rtlCol="0"/>
+          <a:lstStyle>
+            <a:lvl1pPr algn="r">
+              <a:defRPr sz="1200"/>
+            </a:lvl1pPr>
+          </a:lstStyle>
+          <a:p>
+            <a:fld id="{C186884D-CF9C-498C-8F09-CC25657E25A2}" type="datetimeFigureOut">
+              <a:rPr lang="de-DE" smtClean="0"/>
+              <a:t>20.06.2018</a:t>
+            </a:fld>
+            <a:endParaRPr lang="de-DE"/>
+          </a:p>
+        </p:txBody>
+      </p:sp>
+      <p:sp>
+        <p:nvSpPr>
+          <p:cNvPr id="4" name="Folienbildplatzhalter 3"/>
+          <p:cNvSpPr>
+            <a:spLocks noGrp="1" noRot="1" noChangeAspect="1"/>
+          </p:cNvSpPr>
+          <p:nvPr>
+            <p:ph type="sldImg" idx="2"/>
+          </p:nvPr>
+        </p:nvSpPr>
+        <p:spPr>
+          <a:xfrm>
+            <a:off x="685800" y="1143000"/>
+            <a:ext cx="5486400" cy="3086100"/>
+          </a:xfrm>
+          <a:prstGeom prst="rect">
+            <a:avLst/>
+          </a:prstGeom>
+          <a:noFill/>
+          <a:ln w="12700">
+            <a:solidFill>
+              <a:prstClr val="black"/>
+            </a:solidFill>
+          </a:ln>
+        </p:spPr>
+        <p:txBody>
+          <a:bodyPr vert="horz" lIns="91440" tIns="45720" rIns="91440" bIns="45720" rtlCol="0" anchor="ctr"/>
+          <a:lstStyle/>
+          <a:p>
+            <a:endParaRPr lang="de-DE"/>
+          </a:p>
+        </p:txBody>
+      </p:sp>
+      <p:sp>
+        <p:nvSpPr>
+          <p:cNvPr id="5" name="Notizenplatzhalter 4"/>
+          <p:cNvSpPr>
+            <a:spLocks noGrp="1"/>
+          </p:cNvSpPr>
+          <p:nvPr>
+            <p:ph type="body" sz="quarter" idx="3"/>
+          </p:nvPr>
+        </p:nvSpPr>
+        <p:spPr>
+          <a:xfrm>
+            <a:off x="685800" y="4400550"/>
+            <a:ext cx="5486400" cy="3600450"/>
+          </a:xfrm>
+          <a:prstGeom prst="rect">
+            <a:avLst/>
+          </a:prstGeom>
+        </p:spPr>
+        <p:txBody>
+          <a:bodyPr vert="horz" lIns="91440" tIns="45720" rIns="91440" bIns="45720" rtlCol="0"/>
+          <a:lstStyle/>
+          <a:p>
+            <a:pPr lvl="0"/>
+            <a:r>
+              <a:rPr lang="de-DE"/>
+              <a:t>Mastertextformat bearbeiten</a:t>
+            </a:r>
+          </a:p>
+          <a:p>
+            <a:pPr lvl="1"/>
+            <a:r>
+              <a:rPr lang="de-DE"/>
+              <a:t>Zweite Ebene</a:t>
+            </a:r>
+          </a:p>
+          <a:p>
+            <a:pPr lvl="2"/>
+            <a:r>
+              <a:rPr lang="de-DE"/>
+              <a:t>Dritte Ebene</a:t>
+            </a:r>
+          </a:p>
+          <a:p>
+            <a:pPr lvl="3"/>
+            <a:r>
+              <a:rPr lang="de-DE"/>
+              <a:t>Vierte Ebene</a:t>
+            </a:r>
+          </a:p>
+          <a:p>
+            <a:pPr lvl="4"/>
+            <a:r>
+              <a:rPr lang="de-DE"/>
+              <a:t>Fünfte Ebene</a:t>
+            </a:r>
+          </a:p>
+        </p:txBody>
+      </p:sp>
+      <p:sp>
+        <p:nvSpPr>
+          <p:cNvPr id="6" name="Fußzeilenplatzhalter 5"/>
+          <p:cNvSpPr>
+            <a:spLocks noGrp="1"/>
+          </p:cNvSpPr>
+          <p:nvPr>
+            <p:ph type="ftr" sz="quarter" idx="4"/>
+          </p:nvPr>
+        </p:nvSpPr>
+        <p:spPr>
+          <a:xfrm>
+            <a:off x="0" y="8685213"/>
+            <a:ext cx="2971800" cy="458787"/>
+          </a:xfrm>
+          <a:prstGeom prst="rect">
+            <a:avLst/>
+          </a:prstGeom>
+        </p:spPr>
+        <p:txBody>
+          <a:bodyPr vert="horz" lIns="91440" tIns="45720" rIns="91440" bIns="45720" rtlCol="0" anchor="b"/>
+          <a:lstStyle>
+            <a:lvl1pPr algn="l">
+              <a:defRPr sz="1200"/>
+            </a:lvl1pPr>
+          </a:lstStyle>
+          <a:p>
+            <a:endParaRPr lang="de-DE"/>
+          </a:p>
+        </p:txBody>
+      </p:sp>
+      <p:sp>
+        <p:nvSpPr>
+          <p:cNvPr id="7" name="Foliennummernplatzhalter 6"/>
+          <p:cNvSpPr>
+            <a:spLocks noGrp="1"/>
+          </p:cNvSpPr>
+          <p:nvPr>
+            <p:ph type="sldNum" sz="quarter" idx="5"/>
+          </p:nvPr>
+        </p:nvSpPr>
+        <p:spPr>
+          <a:xfrm>
+            <a:off x="3884613" y="8685213"/>
+            <a:ext cx="2971800" cy="458787"/>
+          </a:xfrm>
+          <a:prstGeom prst="rect">
+            <a:avLst/>
+          </a:prstGeom>
+        </p:spPr>
+        <p:txBody>
+          <a:bodyPr vert="horz" lIns="91440" tIns="45720" rIns="91440" bIns="45720" rtlCol="0" anchor="b"/>
+          <a:lstStyle>
+            <a:lvl1pPr algn="r">
+              <a:defRPr sz="1200"/>
+            </a:lvl1pPr>
+          </a:lstStyle>
+          <a:p>
+            <a:fld id="{8E2B2159-553F-44D2-A7EA-4585E9EF0B5F}" type="slidenum">
+              <a:rPr lang="de-DE" smtClean="0"/>
+              <a:t>‹Nr.›</a:t>
+            </a:fld>
+            <a:endParaRPr lang="de-DE"/>
+          </a:p>
+        </p:txBody>
+      </p:sp>
+    </p:spTree>
+    <p:extLst>
+      <p:ext uri="{BB962C8B-B14F-4D97-AF65-F5344CB8AC3E}">
+        <p14:creationId xmlns:p14="http://schemas.microsoft.com/office/powerpoint/2010/main" val="1125757813"/>
+      </p:ext>
+    </p:extLst>
+  </p:cSld>
+  <p:clrMap bg1="lt1" tx1="dk1" bg2="lt2" tx2="dk2" accent1="accent1" accent2="accent2" accent3="accent3" accent4="accent4" accent5="accent5" accent6="accent6" hlink="hlink" folHlink="folHlink"/>
+  <p:notesStyle>
+    <a:lvl1pPr marL="0" algn="l" defTabSz="914400" rtl="0" eaLnBrk="1" latinLnBrk="0" hangingPunct="1">
+      <a:defRPr sz="1200" kern="1200">
+        <a:solidFill>
+          <a:schemeClr val="tx1"/>
+        </a:solidFill>
+        <a:latin typeface="+mn-lt"/>
+        <a:ea typeface="+mn-ea"/>
+        <a:cs typeface="+mn-cs"/>
+      </a:defRPr>
+    </a:lvl1pPr>
+    <a:lvl2pPr marL="457200" algn="l" defTabSz="914400" rtl="0" eaLnBrk="1" latinLnBrk="0" hangingPunct="1">
+      <a:defRPr sz="1200" kern="1200">
+        <a:solidFill>
+          <a:schemeClr val="tx1"/>
+        </a:solidFill>
+        <a:latin typeface="+mn-lt"/>
+        <a:ea typeface="+mn-ea"/>
+        <a:cs typeface="+mn-cs"/>
+      </a:defRPr>
+    </a:lvl2pPr>
+    <a:lvl3pPr marL="914400" algn="l" defTabSz="914400" rtl="0" eaLnBrk="1" latinLnBrk="0" hangingPunct="1">
+      <a:defRPr sz="1200" kern="1200">
+        <a:solidFill>
+          <a:schemeClr val="tx1"/>
+        </a:solidFill>
+        <a:latin typeface="+mn-lt"/>
+        <a:ea typeface="+mn-ea"/>
+        <a:cs typeface="+mn-cs"/>
+      </a:defRPr>
+    </a:lvl3pPr>
+    <a:lvl4pPr marL="1371600" algn="l" defTabSz="914400" rtl="0" eaLnBrk="1" latinLnBrk="0" hangingPunct="1">
+      <a:defRPr sz="1200" kern="1200">
+        <a:solidFill>
+          <a:schemeClr val="tx1"/>
+        </a:solidFill>
+        <a:latin typeface="+mn-lt"/>
+        <a:ea typeface="+mn-ea"/>
+        <a:cs typeface="+mn-cs"/>
+      </a:defRPr>
+    </a:lvl4pPr>
+    <a:lvl5pPr marL="1828800" algn="l" defTabSz="914400" rtl="0" eaLnBrk="1" latinLnBrk="0" hangingPunct="1">
+      <a:defRPr sz="1200" kern="1200">
+        <a:solidFill>
+          <a:schemeClr val="tx1"/>
+        </a:solidFill>
+        <a:latin typeface="+mn-lt"/>
+        <a:ea typeface="+mn-ea"/>
+        <a:cs typeface="+mn-cs"/>
+      </a:defRPr>
+    </a:lvl5pPr>
+    <a:lvl6pPr marL="2286000" algn="l" defTabSz="914400" rtl="0" eaLnBrk="1" latinLnBrk="0" hangingPunct="1">
+      <a:defRPr sz="1200" kern="1200">
+        <a:solidFill>
+          <a:schemeClr val="tx1"/>
+        </a:solidFill>
+        <a:latin typeface="+mn-lt"/>
+        <a:ea typeface="+mn-ea"/>
+        <a:cs typeface="+mn-cs"/>
+      </a:defRPr>
+    </a:lvl6pPr>
+    <a:lvl7pPr marL="2743200" algn="l" defTabSz="914400" rtl="0" eaLnBrk="1" latinLnBrk="0" hangingPunct="1">
+      <a:defRPr sz="1200" kern="1200">
+        <a:solidFill>
+          <a:schemeClr val="tx1"/>
+        </a:solidFill>
+        <a:latin typeface="+mn-lt"/>
+        <a:ea typeface="+mn-ea"/>
+        <a:cs typeface="+mn-cs"/>
+      </a:defRPr>
+    </a:lvl7pPr>
+    <a:lvl8pPr marL="3200400" algn="l" defTabSz="914400" rtl="0" eaLnBrk="1" latinLnBrk="0" hangingPunct="1">
+      <a:defRPr sz="1200" kern="1200">
+        <a:solidFill>
+          <a:schemeClr val="tx1"/>
+        </a:solidFill>
+        <a:latin typeface="+mn-lt"/>
+        <a:ea typeface="+mn-ea"/>
+        <a:cs typeface="+mn-cs"/>
+      </a:defRPr>
+    </a:lvl8pPr>
+    <a:lvl9pPr marL="3657600" algn="l" defTabSz="914400" rtl="0" eaLnBrk="1" latinLnBrk="0" hangingPunct="1">
+      <a:defRPr sz="1200" kern="1200">
+        <a:solidFill>
+          <a:schemeClr val="tx1"/>
+        </a:solidFill>
+        <a:latin typeface="+mn-lt"/>
+        <a:ea typeface="+mn-ea"/>
+        <a:cs typeface="+mn-cs"/>
+      </a:defRPr>
+    </a:lvl9pPr>
+  </p:notesStyle>
+</p:notesMaster>
+</file>
+
+<file path=ppt/notesSlides/notesSlide1.xml><?xml version="1.0" encoding="utf-8"?>
+<p:notes xmlns:a="http://schemas.openxmlformats.org/drawingml/2006/main" xmlns:r="http://schemas.openxmlformats.org/officeDocument/2006/relationships" xmlns:p="http://schemas.openxmlformats.org/presentationml/2006/main">
+  <p:cSld>
+    <p:spTree>
+      <p:nvGrpSpPr>
+        <p:cNvPr id="1" name=""/>
+        <p:cNvGrpSpPr/>
+        <p:nvPr/>
+      </p:nvGrpSpPr>
+      <p:grpSpPr>
+        <a:xfrm>
+          <a:off x="0" y="0"/>
+          <a:ext cx="0" cy="0"/>
+          <a:chOff x="0" y="0"/>
+          <a:chExt cx="0" cy="0"/>
+        </a:xfrm>
+      </p:grpSpPr>
+      <p:sp>
+        <p:nvSpPr>
+          <p:cNvPr id="2" name="Folienbildplatzhalter 1"/>
+          <p:cNvSpPr>
+            <a:spLocks noGrp="1" noRot="1" noChangeAspect="1"/>
+          </p:cNvSpPr>
+          <p:nvPr>
+            <p:ph type="sldImg"/>
+          </p:nvPr>
+        </p:nvSpPr>
+        <p:spPr/>
+      </p:sp>
+      <p:sp>
+        <p:nvSpPr>
+          <p:cNvPr id="3" name="Notizenplatzhalter 2"/>
+          <p:cNvSpPr>
+            <a:spLocks noGrp="1"/>
+          </p:cNvSpPr>
+          <p:nvPr>
+            <p:ph type="body" idx="1"/>
+          </p:nvPr>
+        </p:nvSpPr>
+        <p:spPr/>
+        <p:txBody>
+          <a:bodyPr/>
+          <a:lstStyle/>
+          <a:p>
+            <a:r>
+              <a:rPr lang="de-DE" dirty="0"/>
+              <a:t>Je Knoten MAX Wert mitführen und bei 1 Vergleich jeweils und wenn neues Maximum, dann MAX Wert erneuern. Eventuell interessante Information und Verknüpfung zu </a:t>
+            </a:r>
+            <a:r>
+              <a:rPr lang="de-DE" dirty="0" err="1"/>
+              <a:t>Sune</a:t>
+            </a:r>
+            <a:r>
+              <a:rPr lang="de-DE" dirty="0"/>
+              <a:t> Lehman denkbar. </a:t>
+            </a:r>
+          </a:p>
+        </p:txBody>
+      </p:sp>
+      <p:sp>
+        <p:nvSpPr>
+          <p:cNvPr id="4" name="Foliennummernplatzhalter 3"/>
+          <p:cNvSpPr>
+            <a:spLocks noGrp="1"/>
+          </p:cNvSpPr>
+          <p:nvPr>
+            <p:ph type="sldNum" sz="quarter" idx="10"/>
+          </p:nvPr>
+        </p:nvSpPr>
+        <p:spPr/>
+        <p:txBody>
+          <a:bodyPr/>
+          <a:lstStyle/>
+          <a:p>
+            <a:fld id="{8E2B2159-553F-44D2-A7EA-4585E9EF0B5F}" type="slidenum">
+              <a:rPr lang="de-DE" smtClean="0"/>
+              <a:t>14</a:t>
+            </a:fld>
+            <a:endParaRPr lang="de-DE"/>
+          </a:p>
+        </p:txBody>
+      </p:sp>
+    </p:spTree>
+    <p:extLst>
+      <p:ext uri="{BB962C8B-B14F-4D97-AF65-F5344CB8AC3E}">
+        <p14:creationId xmlns:p14="http://schemas.microsoft.com/office/powerpoint/2010/main" val="3825179516"/>
+      </p:ext>
+    </p:extLst>
+  </p:cSld>
+  <p:clrMapOvr>
+    <a:masterClrMapping/>
+  </p:clrMapOvr>
+</p:notes>
+</file>
+
+<file path=ppt/notesSlides/notesSlide2.xml><?xml version="1.0" encoding="utf-8"?>
+<p:notes xmlns:a="http://schemas.openxmlformats.org/drawingml/2006/main" xmlns:r="http://schemas.openxmlformats.org/officeDocument/2006/relationships" xmlns:p="http://schemas.openxmlformats.org/presentationml/2006/main">
+  <p:cSld>
+    <p:spTree>
+      <p:nvGrpSpPr>
+        <p:cNvPr id="1" name=""/>
+        <p:cNvGrpSpPr/>
+        <p:nvPr/>
+      </p:nvGrpSpPr>
+      <p:grpSpPr>
+        <a:xfrm>
+          <a:off x="0" y="0"/>
+          <a:ext cx="0" cy="0"/>
+          <a:chOff x="0" y="0"/>
+          <a:chExt cx="0" cy="0"/>
+        </a:xfrm>
+      </p:grpSpPr>
+      <p:sp>
+        <p:nvSpPr>
+          <p:cNvPr id="2" name="Folienbildplatzhalter 1"/>
+          <p:cNvSpPr>
+            <a:spLocks noGrp="1" noRot="1" noChangeAspect="1"/>
+          </p:cNvSpPr>
+          <p:nvPr>
+            <p:ph type="sldImg"/>
+          </p:nvPr>
+        </p:nvSpPr>
+        <p:spPr/>
+      </p:sp>
+      <p:sp>
+        <p:nvSpPr>
+          <p:cNvPr id="3" name="Notizenplatzhalter 2"/>
+          <p:cNvSpPr>
+            <a:spLocks noGrp="1"/>
+          </p:cNvSpPr>
+          <p:nvPr>
+            <p:ph type="body" idx="1"/>
+          </p:nvPr>
+        </p:nvSpPr>
+        <p:spPr/>
+        <p:txBody>
+          <a:bodyPr/>
+          <a:lstStyle/>
+          <a:p>
+            <a:endParaRPr lang="de-DE" dirty="0"/>
+          </a:p>
+        </p:txBody>
+      </p:sp>
+      <p:sp>
+        <p:nvSpPr>
+          <p:cNvPr id="4" name="Foliennummernplatzhalter 3"/>
+          <p:cNvSpPr>
+            <a:spLocks noGrp="1"/>
+          </p:cNvSpPr>
+          <p:nvPr>
+            <p:ph type="sldNum" sz="quarter" idx="10"/>
+          </p:nvPr>
+        </p:nvSpPr>
+        <p:spPr/>
+        <p:txBody>
+          <a:bodyPr/>
+          <a:lstStyle/>
+          <a:p>
+            <a:fld id="{8E2B2159-553F-44D2-A7EA-4585E9EF0B5F}" type="slidenum">
+              <a:rPr lang="de-DE" smtClean="0"/>
+              <a:t>18</a:t>
+            </a:fld>
+            <a:endParaRPr lang="de-DE"/>
+          </a:p>
+        </p:txBody>
+      </p:sp>
+    </p:spTree>
+    <p:extLst>
+      <p:ext uri="{BB962C8B-B14F-4D97-AF65-F5344CB8AC3E}">
+        <p14:creationId xmlns:p14="http://schemas.microsoft.com/office/powerpoint/2010/main" val="3396188048"/>
+      </p:ext>
+    </p:extLst>
+  </p:cSld>
+  <p:clrMapOvr>
+    <a:masterClrMapping/>
+  </p:clrMapOvr>
+</p:notes>
+</file>
+
 <file path=ppt/slideLayouts/slideLayout1.xml><?xml version="1.0" encoding="utf-8"?>
 <p:sldLayout xmlns:a="http://schemas.openxmlformats.org/drawingml/2006/main" xmlns:r="http://schemas.openxmlformats.org/officeDocument/2006/relationships" xmlns:p="http://schemas.openxmlformats.org/presentationml/2006/main" type="title" preserve="1">
   <p:cSld name="Titelfolie">
@@ -269,7 +809,7 @@
           <a:p>
             <a:fld id="{AB6B1791-49E8-42BA-A706-CD3267C31A09}" type="datetimeFigureOut">
               <a:rPr lang="de-DE" smtClean="0"/>
-              <a:t>04.06.2018</a:t>
+              <a:t>18.06.2018</a:t>
             </a:fld>
             <a:endParaRPr lang="de-DE"/>
           </a:p>
@@ -467,7 +1007,7 @@
           <a:p>
             <a:fld id="{AB6B1791-49E8-42BA-A706-CD3267C31A09}" type="datetimeFigureOut">
               <a:rPr lang="de-DE" smtClean="0"/>
-              <a:t>04.06.2018</a:t>
+              <a:t>18.06.2018</a:t>
             </a:fld>
             <a:endParaRPr lang="de-DE"/>
           </a:p>
@@ -675,7 +1215,7 @@
           <a:p>
             <a:fld id="{AB6B1791-49E8-42BA-A706-CD3267C31A09}" type="datetimeFigureOut">
               <a:rPr lang="de-DE" smtClean="0"/>
-              <a:t>04.06.2018</a:t>
+              <a:t>18.06.2018</a:t>
             </a:fld>
             <a:endParaRPr lang="de-DE"/>
           </a:p>
@@ -873,7 +1413,7 @@
           <a:p>
             <a:fld id="{AB6B1791-49E8-42BA-A706-CD3267C31A09}" type="datetimeFigureOut">
               <a:rPr lang="de-DE" smtClean="0"/>
-              <a:t>04.06.2018</a:t>
+              <a:t>18.06.2018</a:t>
             </a:fld>
             <a:endParaRPr lang="de-DE"/>
           </a:p>
@@ -1148,7 +1688,7 @@
           <a:p>
             <a:fld id="{AB6B1791-49E8-42BA-A706-CD3267C31A09}" type="datetimeFigureOut">
               <a:rPr lang="de-DE" smtClean="0"/>
-              <a:t>04.06.2018</a:t>
+              <a:t>18.06.2018</a:t>
             </a:fld>
             <a:endParaRPr lang="de-DE"/>
           </a:p>
@@ -1413,7 +1953,7 @@
           <a:p>
             <a:fld id="{AB6B1791-49E8-42BA-A706-CD3267C31A09}" type="datetimeFigureOut">
               <a:rPr lang="de-DE" smtClean="0"/>
-              <a:t>04.06.2018</a:t>
+              <a:t>18.06.2018</a:t>
             </a:fld>
             <a:endParaRPr lang="de-DE"/>
           </a:p>
@@ -1825,7 +2365,7 @@
           <a:p>
             <a:fld id="{AB6B1791-49E8-42BA-A706-CD3267C31A09}" type="datetimeFigureOut">
               <a:rPr lang="de-DE" smtClean="0"/>
-              <a:t>04.06.2018</a:t>
+              <a:t>18.06.2018</a:t>
             </a:fld>
             <a:endParaRPr lang="de-DE"/>
           </a:p>
@@ -1966,7 +2506,7 @@
           <a:p>
             <a:fld id="{AB6B1791-49E8-42BA-A706-CD3267C31A09}" type="datetimeFigureOut">
               <a:rPr lang="de-DE" smtClean="0"/>
-              <a:t>04.06.2018</a:t>
+              <a:t>18.06.2018</a:t>
             </a:fld>
             <a:endParaRPr lang="de-DE"/>
           </a:p>
@@ -2079,7 +2619,7 @@
           <a:p>
             <a:fld id="{AB6B1791-49E8-42BA-A706-CD3267C31A09}" type="datetimeFigureOut">
               <a:rPr lang="de-DE" smtClean="0"/>
-              <a:t>04.06.2018</a:t>
+              <a:t>18.06.2018</a:t>
             </a:fld>
             <a:endParaRPr lang="de-DE"/>
           </a:p>
@@ -2390,7 +2930,7 @@
           <a:p>
             <a:fld id="{AB6B1791-49E8-42BA-A706-CD3267C31A09}" type="datetimeFigureOut">
               <a:rPr lang="de-DE" smtClean="0"/>
-              <a:t>04.06.2018</a:t>
+              <a:t>18.06.2018</a:t>
             </a:fld>
             <a:endParaRPr lang="de-DE"/>
           </a:p>
@@ -2678,7 +3218,7 @@
           <a:p>
             <a:fld id="{AB6B1791-49E8-42BA-A706-CD3267C31A09}" type="datetimeFigureOut">
               <a:rPr lang="de-DE" smtClean="0"/>
-              <a:t>04.06.2018</a:t>
+              <a:t>18.06.2018</a:t>
             </a:fld>
             <a:endParaRPr lang="de-DE"/>
           </a:p>
@@ -2919,7 +3459,7 @@
           <a:p>
             <a:fld id="{AB6B1791-49E8-42BA-A706-CD3267C31A09}" type="datetimeFigureOut">
               <a:rPr lang="de-DE" smtClean="0"/>
-              <a:t>04.06.2018</a:t>
+              <a:t>18.06.2018</a:t>
             </a:fld>
             <a:endParaRPr lang="de-DE"/>
           </a:p>
@@ -3522,6 +4062,1381 @@
       </p:grpSpPr>
       <p:sp>
         <p:nvSpPr>
+          <p:cNvPr id="2" name="Titel 1">
+            <a:extLst>
+              <a:ext uri="{FF2B5EF4-FFF2-40B4-BE49-F238E27FC236}">
+                <a16:creationId xmlns:a16="http://schemas.microsoft.com/office/drawing/2014/main" id="{1C440A56-41C2-4DDD-856B-E3D546F0D3CA}"/>
+              </a:ext>
+            </a:extLst>
+          </p:cNvPr>
+          <p:cNvSpPr>
+            <a:spLocks noGrp="1"/>
+          </p:cNvSpPr>
+          <p:nvPr>
+            <p:ph type="title"/>
+          </p:nvPr>
+        </p:nvSpPr>
+        <p:spPr/>
+        <p:txBody>
+          <a:bodyPr/>
+          <a:lstStyle/>
+          <a:p>
+            <a:r>
+              <a:rPr lang="de-DE" dirty="0"/>
+              <a:t>Temporaler Graph nach [2]</a:t>
+            </a:r>
+          </a:p>
+        </p:txBody>
+      </p:sp>
+      <p:sp>
+        <p:nvSpPr>
+          <p:cNvPr id="3" name="Inhaltsplatzhalter 2">
+            <a:extLst>
+              <a:ext uri="{FF2B5EF4-FFF2-40B4-BE49-F238E27FC236}">
+                <a16:creationId xmlns:a16="http://schemas.microsoft.com/office/drawing/2014/main" id="{EAE5D7CF-FCAE-40C4-BEC3-D213D60C8599}"/>
+              </a:ext>
+            </a:extLst>
+          </p:cNvPr>
+          <p:cNvSpPr>
+            <a:spLocks noGrp="1"/>
+          </p:cNvSpPr>
+          <p:nvPr>
+            <p:ph idx="1"/>
+          </p:nvPr>
+        </p:nvSpPr>
+        <p:spPr/>
+        <p:txBody>
+          <a:bodyPr>
+            <a:normAutofit lnSpcReduction="10000"/>
+          </a:bodyPr>
+          <a:lstStyle/>
+          <a:p>
+            <a:r>
+              <a:rPr lang="de-DE" dirty="0"/>
+              <a:t>Graph G = (V,E)</a:t>
+            </a:r>
+          </a:p>
+          <a:p>
+            <a:r>
+              <a:rPr lang="de-DE" dirty="0"/>
+              <a:t>Knoten v = (</a:t>
+            </a:r>
+            <a:r>
+              <a:rPr lang="de-DE" dirty="0" err="1"/>
+              <a:t>id</a:t>
+            </a:r>
+            <a:r>
+              <a:rPr lang="de-DE" dirty="0"/>
+              <a:t>, P, </a:t>
+            </a:r>
+            <a:r>
+              <a:rPr lang="de-DE" dirty="0" err="1"/>
+              <a:t>DynP</a:t>
+            </a:r>
+            <a:r>
+              <a:rPr lang="de-DE" dirty="0"/>
+              <a:t>) ∈ V</a:t>
+            </a:r>
+          </a:p>
+          <a:p>
+            <a:pPr lvl="1"/>
+            <a:r>
+              <a:rPr lang="de-DE" dirty="0"/>
+              <a:t>P ist ein Set von statischen Properties (unveränderlich)</a:t>
+            </a:r>
+          </a:p>
+          <a:p>
+            <a:pPr lvl="1"/>
+            <a:r>
+              <a:rPr lang="de-DE" dirty="0" err="1"/>
+              <a:t>DynP</a:t>
+            </a:r>
+            <a:r>
+              <a:rPr lang="de-DE" dirty="0"/>
+              <a:t> ist ein Set von dynamischen </a:t>
+            </a:r>
+            <a:r>
+              <a:rPr lang="de-DE" dirty="0" err="1"/>
+              <a:t>Proporties</a:t>
+            </a:r>
+            <a:endParaRPr lang="de-DE" dirty="0"/>
+          </a:p>
+          <a:p>
+            <a:pPr lvl="2"/>
+            <a:r>
+              <a:rPr lang="de-DE" dirty="0" err="1"/>
+              <a:t>dp</a:t>
+            </a:r>
+            <a:r>
+              <a:rPr lang="de-DE" dirty="0"/>
+              <a:t> = (</a:t>
+            </a:r>
+            <a:r>
+              <a:rPr lang="de-DE" dirty="0" err="1"/>
+              <a:t>name</a:t>
+            </a:r>
+            <a:r>
+              <a:rPr lang="de-DE" dirty="0"/>
+              <a:t>, </a:t>
+            </a:r>
+            <a:r>
+              <a:rPr lang="de-DE" dirty="0" err="1"/>
+              <a:t>vlist</a:t>
+            </a:r>
+            <a:r>
+              <a:rPr lang="de-DE" dirty="0"/>
+              <a:t>) ∈ </a:t>
+            </a:r>
+            <a:r>
+              <a:rPr lang="de-DE" dirty="0" err="1"/>
+              <a:t>DynP</a:t>
+            </a:r>
+            <a:r>
+              <a:rPr lang="de-DE" dirty="0"/>
+              <a:t>, mit </a:t>
+            </a:r>
+            <a:r>
+              <a:rPr lang="de-DE" dirty="0" err="1"/>
+              <a:t>vlist</a:t>
+            </a:r>
+            <a:r>
+              <a:rPr lang="de-DE" dirty="0"/>
+              <a:t> als Liste von (t, </a:t>
+            </a:r>
+            <a:r>
+              <a:rPr lang="de-DE" dirty="0" err="1"/>
+              <a:t>value</a:t>
+            </a:r>
+            <a:r>
+              <a:rPr lang="de-DE" dirty="0"/>
+              <a:t>), wobei t bedeutet, dass ab Zeitpunkt t der entsprechende Wert gültig ist. Bei Liste mit (t1, value1), (t2, value2), …, (</a:t>
+            </a:r>
+            <a:r>
+              <a:rPr lang="de-DE" dirty="0" err="1"/>
+              <a:t>tn</a:t>
+            </a:r>
+            <a:r>
+              <a:rPr lang="de-DE" dirty="0"/>
+              <a:t>, </a:t>
+            </a:r>
+            <a:r>
+              <a:rPr lang="de-DE" dirty="0" err="1"/>
+              <a:t>value</a:t>
+            </a:r>
+            <a:r>
+              <a:rPr lang="de-DE" dirty="0"/>
+              <a:t> n) gilt t1 &lt; t2 … &lt; </a:t>
+            </a:r>
+            <a:r>
+              <a:rPr lang="de-DE" dirty="0" err="1"/>
+              <a:t>tn</a:t>
+            </a:r>
+            <a:r>
+              <a:rPr lang="de-DE" dirty="0"/>
+              <a:t> . D.h. </a:t>
+            </a:r>
+            <a:r>
+              <a:rPr lang="de-DE" dirty="0" err="1"/>
+              <a:t>tn</a:t>
+            </a:r>
+            <a:r>
+              <a:rPr lang="de-DE" dirty="0"/>
+              <a:t> ist stets der aktuelle Wert.</a:t>
+            </a:r>
+          </a:p>
+          <a:p>
+            <a:pPr lvl="2"/>
+            <a:endParaRPr lang="de-DE" dirty="0"/>
+          </a:p>
+          <a:p>
+            <a:r>
+              <a:rPr lang="de-DE" dirty="0"/>
+              <a:t>Kante e = (</a:t>
+            </a:r>
+            <a:r>
+              <a:rPr lang="de-DE" dirty="0" err="1"/>
+              <a:t>id</a:t>
+            </a:r>
+            <a:r>
+              <a:rPr lang="de-DE" dirty="0"/>
+              <a:t>, </a:t>
+            </a:r>
+            <a:r>
+              <a:rPr lang="de-DE" dirty="0" err="1"/>
+              <a:t>vs</a:t>
+            </a:r>
+            <a:r>
+              <a:rPr lang="de-DE" dirty="0"/>
+              <a:t>, </a:t>
+            </a:r>
+            <a:r>
+              <a:rPr lang="de-DE" dirty="0" err="1"/>
+              <a:t>ve</a:t>
+            </a:r>
+            <a:r>
+              <a:rPr lang="de-DE" dirty="0"/>
+              <a:t>, </a:t>
+            </a:r>
+            <a:r>
+              <a:rPr lang="de-DE" dirty="0" err="1"/>
+              <a:t>ty</a:t>
+            </a:r>
+            <a:r>
+              <a:rPr lang="de-DE" dirty="0"/>
+              <a:t>, P, </a:t>
+            </a:r>
+            <a:r>
+              <a:rPr lang="de-DE" dirty="0" err="1"/>
+              <a:t>DynP</a:t>
+            </a:r>
+            <a:r>
+              <a:rPr lang="de-DE" dirty="0"/>
+              <a:t>) ∈ E</a:t>
+            </a:r>
+          </a:p>
+          <a:p>
+            <a:pPr lvl="1"/>
+            <a:r>
+              <a:rPr lang="de-DE" dirty="0"/>
+              <a:t>Vs und </a:t>
+            </a:r>
+            <a:r>
+              <a:rPr lang="de-DE" dirty="0" err="1"/>
+              <a:t>ve</a:t>
+            </a:r>
+            <a:r>
+              <a:rPr lang="de-DE" dirty="0"/>
+              <a:t> </a:t>
+            </a:r>
+            <a:r>
+              <a:rPr lang="de-DE" dirty="0" err="1"/>
+              <a:t>start</a:t>
+            </a:r>
+            <a:r>
+              <a:rPr lang="de-DE" dirty="0"/>
+              <a:t> und end Knoten, </a:t>
+            </a:r>
+            <a:r>
+              <a:rPr lang="de-DE" dirty="0" err="1"/>
+              <a:t>ty</a:t>
+            </a:r>
+            <a:r>
+              <a:rPr lang="de-DE" dirty="0"/>
+              <a:t> Typ der Kante, P und </a:t>
+            </a:r>
+            <a:r>
+              <a:rPr lang="de-DE" dirty="0" err="1"/>
+              <a:t>DynP</a:t>
+            </a:r>
+            <a:r>
+              <a:rPr lang="de-DE" dirty="0"/>
+              <a:t> wie bei Knoten (dynamische Property z.B. „</a:t>
+            </a:r>
+            <a:r>
+              <a:rPr lang="de-DE" dirty="0" err="1"/>
+              <a:t>isValid</a:t>
+            </a:r>
+            <a:r>
+              <a:rPr lang="de-DE" dirty="0"/>
+              <a:t>“ mit </a:t>
+            </a:r>
+            <a:r>
+              <a:rPr lang="de-DE" dirty="0" err="1"/>
+              <a:t>true</a:t>
+            </a:r>
+            <a:r>
+              <a:rPr lang="de-DE" dirty="0"/>
+              <a:t> und </a:t>
+            </a:r>
+            <a:r>
+              <a:rPr lang="de-DE" dirty="0" err="1"/>
+              <a:t>false</a:t>
+            </a:r>
+            <a:r>
+              <a:rPr lang="de-DE" dirty="0"/>
+              <a:t> je Zeitpunkt t einbauen, um auch zu einem Zeitpunkt nicht existierende Kante realisieren zu können</a:t>
+            </a:r>
+          </a:p>
+          <a:p>
+            <a:pPr marL="914400" lvl="2" indent="0">
+              <a:buNone/>
+            </a:pPr>
+            <a:endParaRPr lang="de-DE" dirty="0"/>
+          </a:p>
+          <a:p>
+            <a:pPr lvl="1"/>
+            <a:endParaRPr lang="de-DE" dirty="0"/>
+          </a:p>
+        </p:txBody>
+      </p:sp>
+    </p:spTree>
+    <p:extLst>
+      <p:ext uri="{BB962C8B-B14F-4D97-AF65-F5344CB8AC3E}">
+        <p14:creationId xmlns:p14="http://schemas.microsoft.com/office/powerpoint/2010/main" val="3374740356"/>
+      </p:ext>
+    </p:extLst>
+  </p:cSld>
+  <p:clrMapOvr>
+    <a:masterClrMapping/>
+  </p:clrMapOvr>
+</p:sld>
+</file>
+
+<file path=ppt/slides/slide12.xml><?xml version="1.0" encoding="utf-8"?>
+<p:sld xmlns:a="http://schemas.openxmlformats.org/drawingml/2006/main" xmlns:r="http://schemas.openxmlformats.org/officeDocument/2006/relationships" xmlns:p="http://schemas.openxmlformats.org/presentationml/2006/main">
+  <p:cSld>
+    <p:spTree>
+      <p:nvGrpSpPr>
+        <p:cNvPr id="1" name=""/>
+        <p:cNvGrpSpPr/>
+        <p:nvPr/>
+      </p:nvGrpSpPr>
+      <p:grpSpPr>
+        <a:xfrm>
+          <a:off x="0" y="0"/>
+          <a:ext cx="0" cy="0"/>
+          <a:chOff x="0" y="0"/>
+          <a:chExt cx="0" cy="0"/>
+        </a:xfrm>
+      </p:grpSpPr>
+      <p:sp>
+        <p:nvSpPr>
+          <p:cNvPr id="2" name="Titel 1">
+            <a:extLst>
+              <a:ext uri="{FF2B5EF4-FFF2-40B4-BE49-F238E27FC236}">
+                <a16:creationId xmlns:a16="http://schemas.microsoft.com/office/drawing/2014/main" id="{D736BC27-AE58-40CA-B63E-755AD3EE22C4}"/>
+              </a:ext>
+            </a:extLst>
+          </p:cNvPr>
+          <p:cNvSpPr>
+            <a:spLocks noGrp="1"/>
+          </p:cNvSpPr>
+          <p:nvPr>
+            <p:ph type="title"/>
+          </p:nvPr>
+        </p:nvSpPr>
+        <p:spPr/>
+        <p:txBody>
+          <a:bodyPr/>
+          <a:lstStyle/>
+          <a:p>
+            <a:r>
+              <a:rPr lang="de-DE" dirty="0"/>
+              <a:t>Bestandteile Graph (1)</a:t>
+            </a:r>
+          </a:p>
+        </p:txBody>
+      </p:sp>
+      <p:sp>
+        <p:nvSpPr>
+          <p:cNvPr id="3" name="Inhaltsplatzhalter 2">
+            <a:extLst>
+              <a:ext uri="{FF2B5EF4-FFF2-40B4-BE49-F238E27FC236}">
+                <a16:creationId xmlns:a16="http://schemas.microsoft.com/office/drawing/2014/main" id="{4ABE963E-EDC9-4A38-82F9-86E8A410D02E}"/>
+              </a:ext>
+            </a:extLst>
+          </p:cNvPr>
+          <p:cNvSpPr>
+            <a:spLocks noGrp="1"/>
+          </p:cNvSpPr>
+          <p:nvPr>
+            <p:ph idx="1"/>
+          </p:nvPr>
+        </p:nvSpPr>
+        <p:spPr>
+          <a:xfrm>
+            <a:off x="838200" y="1494692"/>
+            <a:ext cx="10515600" cy="4682271"/>
+          </a:xfrm>
+        </p:spPr>
+        <p:txBody>
+          <a:bodyPr>
+            <a:normAutofit lnSpcReduction="10000"/>
+          </a:bodyPr>
+          <a:lstStyle/>
+          <a:p>
+            <a:r>
+              <a:rPr lang="de-DE" dirty="0"/>
+              <a:t>Kanten, Knoten</a:t>
+            </a:r>
+          </a:p>
+          <a:p>
+            <a:r>
+              <a:rPr lang="de-DE" dirty="0"/>
+              <a:t>Attribute/Properties eines Knoten:</a:t>
+            </a:r>
+          </a:p>
+          <a:p>
+            <a:pPr lvl="1"/>
+            <a:r>
+              <a:rPr lang="de-DE" dirty="0"/>
+              <a:t>Feste Properties wie z.B. In-/ und Out-Degree</a:t>
+            </a:r>
+          </a:p>
+          <a:p>
+            <a:pPr lvl="1"/>
+            <a:r>
+              <a:rPr lang="de-DE" dirty="0"/>
+              <a:t>Variable Properties je nach Anwendungsfall</a:t>
+            </a:r>
+          </a:p>
+          <a:p>
+            <a:r>
+              <a:rPr lang="de-DE" dirty="0"/>
+              <a:t>Teilgraph jeder Form denkbar – AGG-</a:t>
+            </a:r>
+            <a:r>
+              <a:rPr lang="de-DE" dirty="0" err="1"/>
+              <a:t>Fkt</a:t>
+            </a:r>
+            <a:r>
+              <a:rPr lang="de-DE" dirty="0"/>
+              <a:t>. auf </a:t>
+            </a:r>
+          </a:p>
+          <a:p>
+            <a:pPr lvl="1"/>
+            <a:r>
+              <a:rPr lang="de-DE" dirty="0"/>
+              <a:t>einen Knoten – COUNT eingehende Kanten</a:t>
+            </a:r>
+          </a:p>
+          <a:p>
+            <a:pPr lvl="1"/>
+            <a:r>
+              <a:rPr lang="de-DE" dirty="0"/>
+              <a:t>eine Gruppe von Knoten – SUM auf </a:t>
+            </a:r>
+            <a:r>
+              <a:rPr lang="de-DE" dirty="0" err="1"/>
+              <a:t>Proporty</a:t>
+            </a:r>
+            <a:r>
+              <a:rPr lang="de-DE" dirty="0"/>
+              <a:t> „X“ aller Knoten der Gruppe</a:t>
+            </a:r>
+          </a:p>
+          <a:p>
+            <a:pPr lvl="1"/>
+            <a:r>
+              <a:rPr lang="de-DE" dirty="0"/>
+              <a:t>alle Knoten des Graphen</a:t>
+            </a:r>
+          </a:p>
+          <a:p>
+            <a:r>
+              <a:rPr lang="de-DE" dirty="0" err="1"/>
+              <a:t>Timestamps</a:t>
+            </a:r>
+            <a:r>
+              <a:rPr lang="de-DE" dirty="0"/>
+              <a:t> oder Zeitintervalle, die anzeigen, ob Kante zwischen 2 Knoten aktiv</a:t>
+            </a:r>
+          </a:p>
+          <a:p>
+            <a:pPr lvl="1"/>
+            <a:r>
+              <a:rPr lang="de-DE" dirty="0"/>
+              <a:t>Entscheidung für Zeitintervalle, die je Kante nicht überlappen dürfen</a:t>
+            </a:r>
+          </a:p>
+          <a:p>
+            <a:pPr lvl="1"/>
+            <a:r>
+              <a:rPr lang="de-DE" dirty="0"/>
+              <a:t>Auch </a:t>
+            </a:r>
+            <a:r>
+              <a:rPr lang="de-DE" dirty="0" err="1"/>
+              <a:t>Timestamp</a:t>
+            </a:r>
+            <a:r>
+              <a:rPr lang="de-DE" dirty="0"/>
+              <a:t> okay, der sich auf Intervall mappen lässt</a:t>
+            </a:r>
+          </a:p>
+        </p:txBody>
+      </p:sp>
+    </p:spTree>
+    <p:extLst>
+      <p:ext uri="{BB962C8B-B14F-4D97-AF65-F5344CB8AC3E}">
+        <p14:creationId xmlns:p14="http://schemas.microsoft.com/office/powerpoint/2010/main" val="3473946377"/>
+      </p:ext>
+    </p:extLst>
+  </p:cSld>
+  <p:clrMapOvr>
+    <a:masterClrMapping/>
+  </p:clrMapOvr>
+</p:sld>
+</file>
+
+<file path=ppt/slides/slide13.xml><?xml version="1.0" encoding="utf-8"?>
+<p:sld xmlns:a="http://schemas.openxmlformats.org/drawingml/2006/main" xmlns:r="http://schemas.openxmlformats.org/officeDocument/2006/relationships" xmlns:p="http://schemas.openxmlformats.org/presentationml/2006/main">
+  <p:cSld>
+    <p:spTree>
+      <p:nvGrpSpPr>
+        <p:cNvPr id="1" name=""/>
+        <p:cNvGrpSpPr/>
+        <p:nvPr/>
+      </p:nvGrpSpPr>
+      <p:grpSpPr>
+        <a:xfrm>
+          <a:off x="0" y="0"/>
+          <a:ext cx="0" cy="0"/>
+          <a:chOff x="0" y="0"/>
+          <a:chExt cx="0" cy="0"/>
+        </a:xfrm>
+      </p:grpSpPr>
+      <p:sp>
+        <p:nvSpPr>
+          <p:cNvPr id="2" name="Titel 1">
+            <a:extLst>
+              <a:ext uri="{FF2B5EF4-FFF2-40B4-BE49-F238E27FC236}">
+                <a16:creationId xmlns:a16="http://schemas.microsoft.com/office/drawing/2014/main" id="{0796F704-428F-4920-AD88-E389F7FC0D02}"/>
+              </a:ext>
+            </a:extLst>
+          </p:cNvPr>
+          <p:cNvSpPr>
+            <a:spLocks noGrp="1"/>
+          </p:cNvSpPr>
+          <p:nvPr>
+            <p:ph type="title"/>
+          </p:nvPr>
+        </p:nvSpPr>
+        <p:spPr/>
+        <p:txBody>
+          <a:bodyPr/>
+          <a:lstStyle/>
+          <a:p>
+            <a:r>
+              <a:rPr lang="de-DE" dirty="0"/>
+              <a:t>Mögliche Modellierungen des Zeitaspekts</a:t>
+            </a:r>
+          </a:p>
+        </p:txBody>
+      </p:sp>
+      <p:sp>
+        <p:nvSpPr>
+          <p:cNvPr id="3" name="Inhaltsplatzhalter 2">
+            <a:extLst>
+              <a:ext uri="{FF2B5EF4-FFF2-40B4-BE49-F238E27FC236}">
+                <a16:creationId xmlns:a16="http://schemas.microsoft.com/office/drawing/2014/main" id="{0CA0B7DE-740F-4800-86F1-E4827D27CD16}"/>
+              </a:ext>
+            </a:extLst>
+          </p:cNvPr>
+          <p:cNvSpPr>
+            <a:spLocks noGrp="1"/>
+          </p:cNvSpPr>
+          <p:nvPr>
+            <p:ph idx="1"/>
+          </p:nvPr>
+        </p:nvSpPr>
+        <p:spPr/>
+        <p:txBody>
+          <a:bodyPr>
+            <a:normAutofit lnSpcReduction="10000"/>
+          </a:bodyPr>
+          <a:lstStyle/>
+          <a:p>
+            <a:r>
+              <a:rPr lang="de-DE" dirty="0"/>
+              <a:t>Je Kante eine Funktion, die angibt, ob Kante zu bestimmten Zeitpunkt aktiv (Presence)</a:t>
+            </a:r>
+          </a:p>
+          <a:p>
+            <a:r>
+              <a:rPr lang="de-DE" dirty="0"/>
+              <a:t>Je Kante k eine Art Dauer, die Informationstransport von Knoten A via k zu Knoten B braucht (</a:t>
+            </a:r>
+            <a:r>
+              <a:rPr lang="de-DE" dirty="0" err="1"/>
+              <a:t>Latency</a:t>
+            </a:r>
+            <a:r>
+              <a:rPr lang="de-DE" dirty="0"/>
+              <a:t>)</a:t>
+            </a:r>
+          </a:p>
+          <a:p>
+            <a:r>
+              <a:rPr lang="de-DE" dirty="0"/>
+              <a:t>Presence und </a:t>
+            </a:r>
+            <a:r>
+              <a:rPr lang="de-DE" dirty="0" err="1"/>
+              <a:t>Latency</a:t>
+            </a:r>
+            <a:r>
+              <a:rPr lang="de-DE" dirty="0"/>
+              <a:t> auch für Knoten denkbar</a:t>
+            </a:r>
+          </a:p>
+          <a:p>
+            <a:r>
+              <a:rPr lang="de-DE" dirty="0"/>
+              <a:t>Mehrere nicht ineinander übergehende Zeitintervalle je Kante möglich („Verbindung entsteht, wird getrennt, entsteht wieder“)</a:t>
+            </a:r>
+          </a:p>
+          <a:p>
+            <a:endParaRPr lang="de-DE" dirty="0"/>
+          </a:p>
+          <a:p>
+            <a:pPr>
+              <a:buFont typeface="Wingdings" panose="05000000000000000000" pitchFamily="2" charset="2"/>
+              <a:buChar char="Ø"/>
+            </a:pPr>
+            <a:r>
+              <a:rPr lang="de-DE" dirty="0"/>
+              <a:t>Für die Repräsentation des Graphen je </a:t>
+            </a:r>
+            <a:r>
+              <a:rPr lang="de-DE" dirty="0" err="1"/>
+              <a:t>Relationship</a:t>
+            </a:r>
+            <a:r>
+              <a:rPr lang="de-DE" dirty="0"/>
+              <a:t> Source und Target Knoten sowie Zeitintervall nötig</a:t>
+            </a:r>
+          </a:p>
+        </p:txBody>
+      </p:sp>
+    </p:spTree>
+    <p:extLst>
+      <p:ext uri="{BB962C8B-B14F-4D97-AF65-F5344CB8AC3E}">
+        <p14:creationId xmlns:p14="http://schemas.microsoft.com/office/powerpoint/2010/main" val="1854919232"/>
+      </p:ext>
+    </p:extLst>
+  </p:cSld>
+  <p:clrMapOvr>
+    <a:masterClrMapping/>
+  </p:clrMapOvr>
+</p:sld>
+</file>
+
+<file path=ppt/slides/slide14.xml><?xml version="1.0" encoding="utf-8"?>
+<p:sld xmlns:a="http://schemas.openxmlformats.org/drawingml/2006/main" xmlns:r="http://schemas.openxmlformats.org/officeDocument/2006/relationships" xmlns:p="http://schemas.openxmlformats.org/presentationml/2006/main">
+  <p:cSld>
+    <p:spTree>
+      <p:nvGrpSpPr>
+        <p:cNvPr id="1" name=""/>
+        <p:cNvGrpSpPr/>
+        <p:nvPr/>
+      </p:nvGrpSpPr>
+      <p:grpSpPr>
+        <a:xfrm>
+          <a:off x="0" y="0"/>
+          <a:ext cx="0" cy="0"/>
+          <a:chOff x="0" y="0"/>
+          <a:chExt cx="0" cy="0"/>
+        </a:xfrm>
+      </p:grpSpPr>
+      <p:sp>
+        <p:nvSpPr>
+          <p:cNvPr id="2" name="Titel 1">
+            <a:extLst>
+              <a:ext uri="{FF2B5EF4-FFF2-40B4-BE49-F238E27FC236}">
+                <a16:creationId xmlns:a16="http://schemas.microsoft.com/office/drawing/2014/main" id="{FCAE77A7-1894-405F-A145-F474D8F12CA2}"/>
+              </a:ext>
+            </a:extLst>
+          </p:cNvPr>
+          <p:cNvSpPr>
+            <a:spLocks noGrp="1"/>
+          </p:cNvSpPr>
+          <p:nvPr>
+            <p:ph type="title"/>
+          </p:nvPr>
+        </p:nvSpPr>
+        <p:spPr/>
+        <p:txBody>
+          <a:bodyPr/>
+          <a:lstStyle/>
+          <a:p>
+            <a:r>
+              <a:rPr lang="de-DE" dirty="0"/>
+              <a:t>„Community Level“ (1)</a:t>
+            </a:r>
+          </a:p>
+        </p:txBody>
+      </p:sp>
+      <p:sp>
+        <p:nvSpPr>
+          <p:cNvPr id="3" name="Inhaltsplatzhalter 2">
+            <a:extLst>
+              <a:ext uri="{FF2B5EF4-FFF2-40B4-BE49-F238E27FC236}">
+                <a16:creationId xmlns:a16="http://schemas.microsoft.com/office/drawing/2014/main" id="{CBBD3421-2EA8-4E4D-BFC5-A55B28F0F8E3}"/>
+              </a:ext>
+            </a:extLst>
+          </p:cNvPr>
+          <p:cNvSpPr>
+            <a:spLocks noGrp="1"/>
+          </p:cNvSpPr>
+          <p:nvPr>
+            <p:ph idx="1"/>
+          </p:nvPr>
+        </p:nvSpPr>
+        <p:spPr/>
+        <p:txBody>
+          <a:bodyPr>
+            <a:normAutofit/>
+          </a:bodyPr>
+          <a:lstStyle/>
+          <a:p>
+            <a:r>
+              <a:rPr lang="de-DE" dirty="0"/>
+              <a:t>Welche Community Level werden betrachtet?</a:t>
+            </a:r>
+          </a:p>
+          <a:p>
+            <a:pPr lvl="1"/>
+            <a:r>
+              <a:rPr lang="de-DE" dirty="0"/>
+              <a:t>Ganzer Graph</a:t>
+            </a:r>
+          </a:p>
+          <a:p>
+            <a:pPr lvl="1"/>
+            <a:r>
+              <a:rPr lang="de-DE" dirty="0"/>
+              <a:t>Communities</a:t>
+            </a:r>
+          </a:p>
+          <a:p>
+            <a:pPr lvl="2"/>
+            <a:r>
+              <a:rPr lang="de-DE" dirty="0"/>
+              <a:t>Community als Ansammlung von Knoten, die durch mehr Kanten untereinander verbunden sind als zu restlichen Knoten im Graph</a:t>
+            </a:r>
+          </a:p>
+          <a:p>
+            <a:pPr lvl="2"/>
+            <a:r>
+              <a:rPr lang="de-DE" dirty="0"/>
+              <a:t>2 Herangehensweisen für das Bilden von Communities: </a:t>
+            </a:r>
+          </a:p>
+          <a:p>
+            <a:pPr marL="1371600" lvl="3" indent="0">
+              <a:buNone/>
+            </a:pPr>
+            <a:r>
+              <a:rPr lang="de-DE" dirty="0"/>
+              <a:t>a) Clustering </a:t>
+            </a:r>
+            <a:r>
+              <a:rPr lang="de-DE" dirty="0" err="1"/>
+              <a:t>algorithms</a:t>
+            </a:r>
+            <a:r>
+              <a:rPr lang="de-DE" dirty="0"/>
+              <a:t> (Knoten mit gleichen Attributen) oder b) Community </a:t>
+            </a:r>
+            <a:r>
+              <a:rPr lang="de-DE" dirty="0" err="1"/>
+              <a:t>Detection</a:t>
+            </a:r>
+            <a:r>
+              <a:rPr lang="de-DE" dirty="0"/>
+              <a:t> (Knoten dichter miteinander verbunden als mit anderen) [1]</a:t>
+            </a:r>
+          </a:p>
+          <a:p>
+            <a:pPr lvl="2"/>
+            <a:r>
+              <a:rPr lang="de-DE" dirty="0"/>
+              <a:t>Wie wird Community </a:t>
+            </a:r>
+            <a:r>
+              <a:rPr lang="de-DE" dirty="0" err="1"/>
+              <a:t>Detection</a:t>
+            </a:r>
+            <a:r>
+              <a:rPr lang="de-DE" dirty="0"/>
+              <a:t> durchgeführt? Z.B. Label Propagation Algorithmus auf statischem Graphen – </a:t>
+            </a:r>
+            <a:r>
+              <a:rPr lang="de-DE" dirty="0" err="1"/>
+              <a:t>Detection</a:t>
+            </a:r>
+            <a:r>
+              <a:rPr lang="de-DE" dirty="0"/>
+              <a:t> einmal zu Beginn auf ganzem Graphen oder je Snapshot neu? Geeignete Methode Modell finden</a:t>
+            </a:r>
+          </a:p>
+        </p:txBody>
+      </p:sp>
+    </p:spTree>
+    <p:extLst>
+      <p:ext uri="{BB962C8B-B14F-4D97-AF65-F5344CB8AC3E}">
+        <p14:creationId xmlns:p14="http://schemas.microsoft.com/office/powerpoint/2010/main" val="2587583419"/>
+      </p:ext>
+    </p:extLst>
+  </p:cSld>
+  <p:clrMapOvr>
+    <a:masterClrMapping/>
+  </p:clrMapOvr>
+</p:sld>
+</file>
+
+<file path=ppt/slides/slide15.xml><?xml version="1.0" encoding="utf-8"?>
+<p:sld xmlns:a="http://schemas.openxmlformats.org/drawingml/2006/main" xmlns:r="http://schemas.openxmlformats.org/officeDocument/2006/relationships" xmlns:p="http://schemas.openxmlformats.org/presentationml/2006/main">
+  <p:cSld>
+    <p:spTree>
+      <p:nvGrpSpPr>
+        <p:cNvPr id="1" name=""/>
+        <p:cNvGrpSpPr/>
+        <p:nvPr/>
+      </p:nvGrpSpPr>
+      <p:grpSpPr>
+        <a:xfrm>
+          <a:off x="0" y="0"/>
+          <a:ext cx="0" cy="0"/>
+          <a:chOff x="0" y="0"/>
+          <a:chExt cx="0" cy="0"/>
+        </a:xfrm>
+      </p:grpSpPr>
+      <p:sp>
+        <p:nvSpPr>
+          <p:cNvPr id="2" name="Titel 1">
+            <a:extLst>
+              <a:ext uri="{FF2B5EF4-FFF2-40B4-BE49-F238E27FC236}">
+                <a16:creationId xmlns:a16="http://schemas.microsoft.com/office/drawing/2014/main" id="{85DDDEDB-25FF-497E-A386-5833DCDC55A9}"/>
+              </a:ext>
+            </a:extLst>
+          </p:cNvPr>
+          <p:cNvSpPr>
+            <a:spLocks noGrp="1"/>
+          </p:cNvSpPr>
+          <p:nvPr>
+            <p:ph type="title"/>
+          </p:nvPr>
+        </p:nvSpPr>
+        <p:spPr/>
+        <p:txBody>
+          <a:bodyPr/>
+          <a:lstStyle/>
+          <a:p>
+            <a:r>
+              <a:rPr lang="de-DE" dirty="0"/>
+              <a:t>„Community Level“ (2)</a:t>
+            </a:r>
+          </a:p>
+        </p:txBody>
+      </p:sp>
+      <p:sp>
+        <p:nvSpPr>
+          <p:cNvPr id="3" name="Inhaltsplatzhalter 2">
+            <a:extLst>
+              <a:ext uri="{FF2B5EF4-FFF2-40B4-BE49-F238E27FC236}">
+                <a16:creationId xmlns:a16="http://schemas.microsoft.com/office/drawing/2014/main" id="{5B209D8D-9C18-4D20-9E78-99E6E6A9D33D}"/>
+              </a:ext>
+            </a:extLst>
+          </p:cNvPr>
+          <p:cNvSpPr>
+            <a:spLocks noGrp="1"/>
+          </p:cNvSpPr>
+          <p:nvPr>
+            <p:ph idx="1"/>
+          </p:nvPr>
+        </p:nvSpPr>
+        <p:spPr/>
+        <p:txBody>
+          <a:bodyPr/>
+          <a:lstStyle/>
+          <a:p>
+            <a:pPr lvl="1"/>
+            <a:r>
+              <a:rPr lang="de-DE" dirty="0"/>
+              <a:t>Welche Community Level werden betrachtet?</a:t>
+            </a:r>
+          </a:p>
+          <a:p>
+            <a:pPr lvl="2"/>
+            <a:r>
+              <a:rPr lang="de-DE" dirty="0"/>
+              <a:t>Einzelner Knoten – 2  Hauptuntersuchungsmerkmale (plus weitere):</a:t>
+            </a:r>
+          </a:p>
+          <a:p>
+            <a:pPr lvl="3"/>
+            <a:r>
+              <a:rPr lang="de-DE" dirty="0"/>
+              <a:t>In wie vielen Snapshots existiert Snapshot überhaupt (Existenz als Voraussetzung für Aggregatsberechnung)</a:t>
+            </a:r>
+          </a:p>
+          <a:p>
+            <a:pPr lvl="3"/>
+            <a:r>
+              <a:rPr lang="de-DE" dirty="0"/>
+              <a:t>Anzahl In- und Out-Degree (COUNT)</a:t>
+            </a:r>
+          </a:p>
+          <a:p>
+            <a:pPr lvl="3"/>
+            <a:r>
+              <a:rPr lang="de-DE" dirty="0"/>
+              <a:t>(immer Teil der gleichen Community?)</a:t>
+            </a:r>
+          </a:p>
+          <a:p>
+            <a:pPr lvl="3"/>
+            <a:r>
+              <a:rPr lang="de-DE" dirty="0"/>
+              <a:t>(Teil wie vieler Communities? – </a:t>
+            </a:r>
+            <a:r>
+              <a:rPr lang="de-DE" dirty="0" err="1"/>
+              <a:t>Sune</a:t>
+            </a:r>
+            <a:r>
+              <a:rPr lang="de-DE" dirty="0"/>
+              <a:t>)</a:t>
+            </a:r>
+          </a:p>
+          <a:p>
+            <a:pPr lvl="3"/>
+            <a:r>
+              <a:rPr lang="de-DE" dirty="0"/>
+              <a:t>(zu welchem Zeitpunkt war der höchste „Degree-Count“? (MAX)</a:t>
+            </a:r>
+          </a:p>
+          <a:p>
+            <a:endParaRPr lang="de-DE" dirty="0"/>
+          </a:p>
+        </p:txBody>
+      </p:sp>
+    </p:spTree>
+    <p:extLst>
+      <p:ext uri="{BB962C8B-B14F-4D97-AF65-F5344CB8AC3E}">
+        <p14:creationId xmlns:p14="http://schemas.microsoft.com/office/powerpoint/2010/main" val="3720381745"/>
+      </p:ext>
+    </p:extLst>
+  </p:cSld>
+  <p:clrMapOvr>
+    <a:masterClrMapping/>
+  </p:clrMapOvr>
+</p:sld>
+</file>
+
+<file path=ppt/slides/slide16.xml><?xml version="1.0" encoding="utf-8"?>
+<p:sld xmlns:a="http://schemas.openxmlformats.org/drawingml/2006/main" xmlns:r="http://schemas.openxmlformats.org/officeDocument/2006/relationships" xmlns:p="http://schemas.openxmlformats.org/presentationml/2006/main">
+  <p:cSld>
+    <p:spTree>
+      <p:nvGrpSpPr>
+        <p:cNvPr id="1" name=""/>
+        <p:cNvGrpSpPr/>
+        <p:nvPr/>
+      </p:nvGrpSpPr>
+      <p:grpSpPr>
+        <a:xfrm>
+          <a:off x="0" y="0"/>
+          <a:ext cx="0" cy="0"/>
+          <a:chOff x="0" y="0"/>
+          <a:chExt cx="0" cy="0"/>
+        </a:xfrm>
+      </p:grpSpPr>
+      <p:sp>
+        <p:nvSpPr>
+          <p:cNvPr id="2" name="Titel 1">
+            <a:extLst>
+              <a:ext uri="{FF2B5EF4-FFF2-40B4-BE49-F238E27FC236}">
+                <a16:creationId xmlns:a16="http://schemas.microsoft.com/office/drawing/2014/main" id="{6F395ADC-EF33-4D6A-8505-474D45E0526F}"/>
+              </a:ext>
+            </a:extLst>
+          </p:cNvPr>
+          <p:cNvSpPr>
+            <a:spLocks noGrp="1"/>
+          </p:cNvSpPr>
+          <p:nvPr>
+            <p:ph type="title"/>
+          </p:nvPr>
+        </p:nvSpPr>
+        <p:spPr/>
+        <p:txBody>
+          <a:bodyPr/>
+          <a:lstStyle/>
+          <a:p>
+            <a:r>
+              <a:rPr lang="de-DE" dirty="0"/>
+              <a:t>Aggregate</a:t>
+            </a:r>
+          </a:p>
+        </p:txBody>
+      </p:sp>
+      <p:sp>
+        <p:nvSpPr>
+          <p:cNvPr id="3" name="Inhaltsplatzhalter 2">
+            <a:extLst>
+              <a:ext uri="{FF2B5EF4-FFF2-40B4-BE49-F238E27FC236}">
+                <a16:creationId xmlns:a16="http://schemas.microsoft.com/office/drawing/2014/main" id="{9707EFB3-AF2C-4342-BF57-1B30D92A4D8B}"/>
+              </a:ext>
+            </a:extLst>
+          </p:cNvPr>
+          <p:cNvSpPr>
+            <a:spLocks noGrp="1"/>
+          </p:cNvSpPr>
+          <p:nvPr>
+            <p:ph idx="1"/>
+          </p:nvPr>
+        </p:nvSpPr>
+        <p:spPr/>
+        <p:txBody>
+          <a:bodyPr/>
+          <a:lstStyle/>
+          <a:p>
+            <a:r>
+              <a:rPr lang="de-DE" dirty="0"/>
+              <a:t>Multi-Level Aggregate</a:t>
+            </a:r>
+          </a:p>
+          <a:p>
+            <a:pPr lvl="1"/>
+            <a:r>
+              <a:rPr lang="de-DE" dirty="0"/>
+              <a:t>First-level und </a:t>
+            </a:r>
+            <a:r>
+              <a:rPr lang="de-DE" dirty="0" err="1"/>
+              <a:t>second</a:t>
+            </a:r>
+            <a:r>
+              <a:rPr lang="de-DE" dirty="0"/>
+              <a:t>-level </a:t>
+            </a:r>
+            <a:r>
+              <a:rPr lang="de-DE" dirty="0" err="1"/>
+              <a:t>aggregates</a:t>
+            </a:r>
+            <a:endParaRPr lang="de-DE" dirty="0"/>
+          </a:p>
+          <a:p>
+            <a:r>
+              <a:rPr lang="de-DE" dirty="0"/>
+              <a:t>First-Level Aggregate SUM und COUNT</a:t>
+            </a:r>
+          </a:p>
+          <a:p>
+            <a:r>
+              <a:rPr lang="de-DE" dirty="0"/>
+              <a:t>Second-Level Aggregat in der Arbeit MAX</a:t>
+            </a:r>
+          </a:p>
+          <a:p>
+            <a:pPr lvl="1"/>
+            <a:endParaRPr lang="de-DE" dirty="0"/>
+          </a:p>
+        </p:txBody>
+      </p:sp>
+    </p:spTree>
+    <p:extLst>
+      <p:ext uri="{BB962C8B-B14F-4D97-AF65-F5344CB8AC3E}">
+        <p14:creationId xmlns:p14="http://schemas.microsoft.com/office/powerpoint/2010/main" val="1898977173"/>
+      </p:ext>
+    </p:extLst>
+  </p:cSld>
+  <p:clrMapOvr>
+    <a:masterClrMapping/>
+  </p:clrMapOvr>
+</p:sld>
+</file>
+
+<file path=ppt/slides/slide17.xml><?xml version="1.0" encoding="utf-8"?>
+<p:sld xmlns:a="http://schemas.openxmlformats.org/drawingml/2006/main" xmlns:r="http://schemas.openxmlformats.org/officeDocument/2006/relationships" xmlns:p="http://schemas.openxmlformats.org/presentationml/2006/main">
+  <p:cSld>
+    <p:spTree>
+      <p:nvGrpSpPr>
+        <p:cNvPr id="1" name=""/>
+        <p:cNvGrpSpPr/>
+        <p:nvPr/>
+      </p:nvGrpSpPr>
+      <p:grpSpPr>
+        <a:xfrm>
+          <a:off x="0" y="0"/>
+          <a:ext cx="0" cy="0"/>
+          <a:chOff x="0" y="0"/>
+          <a:chExt cx="0" cy="0"/>
+        </a:xfrm>
+      </p:grpSpPr>
+      <p:sp>
+        <p:nvSpPr>
+          <p:cNvPr id="2" name="Titel 1">
+            <a:extLst>
+              <a:ext uri="{FF2B5EF4-FFF2-40B4-BE49-F238E27FC236}">
+                <a16:creationId xmlns:a16="http://schemas.microsoft.com/office/drawing/2014/main" id="{986368E9-E87E-4C13-8327-4B2C1B1B44EF}"/>
+              </a:ext>
+            </a:extLst>
+          </p:cNvPr>
+          <p:cNvSpPr>
+            <a:spLocks noGrp="1"/>
+          </p:cNvSpPr>
+          <p:nvPr>
+            <p:ph type="title"/>
+          </p:nvPr>
+        </p:nvSpPr>
+        <p:spPr/>
+        <p:txBody>
+          <a:bodyPr/>
+          <a:lstStyle/>
+          <a:p>
+            <a:r>
+              <a:rPr lang="de-DE" dirty="0"/>
+              <a:t>Berechnungs-Ansätze</a:t>
+            </a:r>
+          </a:p>
+        </p:txBody>
+      </p:sp>
+      <p:sp>
+        <p:nvSpPr>
+          <p:cNvPr id="3" name="Inhaltsplatzhalter 2">
+            <a:extLst>
+              <a:ext uri="{FF2B5EF4-FFF2-40B4-BE49-F238E27FC236}">
+                <a16:creationId xmlns:a16="http://schemas.microsoft.com/office/drawing/2014/main" id="{D368E98C-AA40-4964-95F0-BC8046A3BFFD}"/>
+              </a:ext>
+            </a:extLst>
+          </p:cNvPr>
+          <p:cNvSpPr>
+            <a:spLocks noGrp="1"/>
+          </p:cNvSpPr>
+          <p:nvPr>
+            <p:ph idx="1"/>
+          </p:nvPr>
+        </p:nvSpPr>
+        <p:spPr/>
+        <p:txBody>
+          <a:bodyPr/>
+          <a:lstStyle/>
+          <a:p>
+            <a:r>
+              <a:rPr lang="de-DE" dirty="0"/>
+              <a:t>Iterativ vs. Inkrementell</a:t>
+            </a:r>
+          </a:p>
+          <a:p>
+            <a:r>
+              <a:rPr lang="de-DE" dirty="0"/>
+              <a:t>Snapshot vs. Stream vs. </a:t>
+            </a:r>
+            <a:r>
+              <a:rPr lang="de-DE" dirty="0" err="1"/>
+              <a:t>Sliding</a:t>
+            </a:r>
+            <a:r>
+              <a:rPr lang="de-DE" dirty="0"/>
+              <a:t> </a:t>
+            </a:r>
+            <a:r>
+              <a:rPr lang="de-DE" dirty="0" err="1"/>
+              <a:t>Window</a:t>
+            </a:r>
+            <a:endParaRPr lang="de-DE" dirty="0"/>
+          </a:p>
+          <a:p>
+            <a:r>
+              <a:rPr lang="de-DE" dirty="0"/>
+              <a:t>Snapshot selbst zu einem exakten Zeitpunkt</a:t>
+            </a:r>
+          </a:p>
+          <a:p>
+            <a:endParaRPr lang="de-DE" dirty="0"/>
+          </a:p>
+          <a:p>
+            <a:endParaRPr lang="de-DE" dirty="0"/>
+          </a:p>
+        </p:txBody>
+      </p:sp>
+    </p:spTree>
+    <p:extLst>
+      <p:ext uri="{BB962C8B-B14F-4D97-AF65-F5344CB8AC3E}">
+        <p14:creationId xmlns:p14="http://schemas.microsoft.com/office/powerpoint/2010/main" val="4008171559"/>
+      </p:ext>
+    </p:extLst>
+  </p:cSld>
+  <p:clrMapOvr>
+    <a:masterClrMapping/>
+  </p:clrMapOvr>
+</p:sld>
+</file>
+
+<file path=ppt/slides/slide18.xml><?xml version="1.0" encoding="utf-8"?>
+<p:sld xmlns:a="http://schemas.openxmlformats.org/drawingml/2006/main" xmlns:r="http://schemas.openxmlformats.org/officeDocument/2006/relationships" xmlns:p="http://schemas.openxmlformats.org/presentationml/2006/main">
+  <p:cSld>
+    <p:spTree>
+      <p:nvGrpSpPr>
+        <p:cNvPr id="1" name=""/>
+        <p:cNvGrpSpPr/>
+        <p:nvPr/>
+      </p:nvGrpSpPr>
+      <p:grpSpPr>
+        <a:xfrm>
+          <a:off x="0" y="0"/>
+          <a:ext cx="0" cy="0"/>
+          <a:chOff x="0" y="0"/>
+          <a:chExt cx="0" cy="0"/>
+        </a:xfrm>
+      </p:grpSpPr>
+      <p:sp>
+        <p:nvSpPr>
+          <p:cNvPr id="2" name="Titel 1">
+            <a:extLst>
+              <a:ext uri="{FF2B5EF4-FFF2-40B4-BE49-F238E27FC236}">
+                <a16:creationId xmlns:a16="http://schemas.microsoft.com/office/drawing/2014/main" id="{EAF93ADA-768F-4885-86C4-0EE90A0BEF2F}"/>
+              </a:ext>
+            </a:extLst>
+          </p:cNvPr>
+          <p:cNvSpPr>
+            <a:spLocks noGrp="1"/>
+          </p:cNvSpPr>
+          <p:nvPr>
+            <p:ph type="title"/>
+          </p:nvPr>
+        </p:nvSpPr>
+        <p:spPr/>
+        <p:txBody>
+          <a:bodyPr/>
+          <a:lstStyle/>
+          <a:p>
+            <a:r>
+              <a:rPr lang="de-DE" dirty="0" err="1"/>
+              <a:t>Sune</a:t>
+            </a:r>
+            <a:r>
+              <a:rPr lang="de-DE" dirty="0"/>
+              <a:t> Lehmann</a:t>
+            </a:r>
+          </a:p>
+        </p:txBody>
+      </p:sp>
+      <p:sp>
+        <p:nvSpPr>
+          <p:cNvPr id="3" name="Inhaltsplatzhalter 2">
+            <a:extLst>
+              <a:ext uri="{FF2B5EF4-FFF2-40B4-BE49-F238E27FC236}">
+                <a16:creationId xmlns:a16="http://schemas.microsoft.com/office/drawing/2014/main" id="{94BCBA02-9916-42B5-83F6-2C3200083E9F}"/>
+              </a:ext>
+            </a:extLst>
+          </p:cNvPr>
+          <p:cNvSpPr>
+            <a:spLocks noGrp="1"/>
+          </p:cNvSpPr>
+          <p:nvPr>
+            <p:ph idx="1"/>
+          </p:nvPr>
+        </p:nvSpPr>
+        <p:spPr/>
+        <p:txBody>
+          <a:bodyPr>
+            <a:normAutofit fontScale="92500" lnSpcReduction="20000"/>
+          </a:bodyPr>
+          <a:lstStyle/>
+          <a:p>
+            <a:r>
+              <a:rPr lang="de-DE" dirty="0"/>
+              <a:t>Knoten kann Teil mehrerer Gruppen/Communities sein</a:t>
+            </a:r>
+          </a:p>
+          <a:p>
+            <a:r>
+              <a:rPr lang="de-DE" dirty="0"/>
+              <a:t>Immer wieder auftauchende Gruppen bilden sog. Cores</a:t>
+            </a:r>
+          </a:p>
+          <a:p>
+            <a:r>
+              <a:rPr lang="de-DE" dirty="0"/>
+              <a:t>Core als Fundamente sozialer </a:t>
+            </a:r>
+            <a:r>
+              <a:rPr lang="de-DE" dirty="0" err="1"/>
+              <a:t>Netwerke</a:t>
+            </a:r>
+            <a:endParaRPr lang="de-DE" dirty="0"/>
+          </a:p>
+          <a:p>
+            <a:r>
+              <a:rPr lang="de-DE" dirty="0"/>
+              <a:t>Das tatsächliche zu einem bestimmten Zeitpunkt Zusammenfinden mehrerer Knoten eines Cores wird als sog. </a:t>
+            </a:r>
+            <a:r>
+              <a:rPr lang="de-DE" dirty="0" err="1"/>
+              <a:t>Gatherings</a:t>
+            </a:r>
+            <a:r>
+              <a:rPr lang="de-DE" dirty="0"/>
+              <a:t> bezeichnet</a:t>
+            </a:r>
+          </a:p>
+          <a:p>
+            <a:r>
+              <a:rPr lang="de-DE" dirty="0" err="1"/>
+              <a:t>Gatherings</a:t>
+            </a:r>
+            <a:r>
+              <a:rPr lang="de-DE" dirty="0"/>
+              <a:t> stellen Instanzen der Cores dar</a:t>
+            </a:r>
+          </a:p>
+          <a:p>
+            <a:pPr marL="0" indent="0">
+              <a:buNone/>
+            </a:pPr>
+            <a:endParaRPr lang="de-DE" dirty="0"/>
+          </a:p>
+          <a:p>
+            <a:pPr>
+              <a:buFont typeface="Wingdings" panose="05000000000000000000" pitchFamily="2" charset="2"/>
+              <a:buChar char="Ø"/>
+            </a:pPr>
+            <a:r>
+              <a:rPr lang="de-DE" dirty="0"/>
+              <a:t> Cores und deren Aktivierung als Grund für dynamische Netzwerke</a:t>
+            </a:r>
+          </a:p>
+          <a:p>
+            <a:pPr>
+              <a:buFont typeface="Wingdings" panose="05000000000000000000" pitchFamily="2" charset="2"/>
+              <a:buChar char="Ø"/>
+            </a:pPr>
+            <a:r>
+              <a:rPr lang="de-DE" dirty="0"/>
+              <a:t>Bei der „richtigen Gruppierung“ der Knoten diese Erkenntnis beachten, dass Knoten Teil mehrerer Communities sein kann. Zu welcher dann zuordnen? Oder Teil mehrerer?</a:t>
+            </a:r>
+          </a:p>
+          <a:p>
+            <a:endParaRPr lang="de-DE" dirty="0"/>
+          </a:p>
+        </p:txBody>
+      </p:sp>
+    </p:spTree>
+    <p:extLst>
+      <p:ext uri="{BB962C8B-B14F-4D97-AF65-F5344CB8AC3E}">
+        <p14:creationId xmlns:p14="http://schemas.microsoft.com/office/powerpoint/2010/main" val="2239550165"/>
+      </p:ext>
+    </p:extLst>
+  </p:cSld>
+  <p:clrMapOvr>
+    <a:masterClrMapping/>
+  </p:clrMapOvr>
+</p:sld>
+</file>
+
+<file path=ppt/slides/slide19.xml><?xml version="1.0" encoding="utf-8"?>
+<p:sld xmlns:a="http://schemas.openxmlformats.org/drawingml/2006/main" xmlns:r="http://schemas.openxmlformats.org/officeDocument/2006/relationships" xmlns:p="http://schemas.openxmlformats.org/presentationml/2006/main">
+  <p:cSld>
+    <p:spTree>
+      <p:nvGrpSpPr>
+        <p:cNvPr id="1" name=""/>
+        <p:cNvGrpSpPr/>
+        <p:nvPr/>
+      </p:nvGrpSpPr>
+      <p:grpSpPr>
+        <a:xfrm>
+          <a:off x="0" y="0"/>
+          <a:ext cx="0" cy="0"/>
+          <a:chOff x="0" y="0"/>
+          <a:chExt cx="0" cy="0"/>
+        </a:xfrm>
+      </p:grpSpPr>
+      <p:sp>
+        <p:nvSpPr>
           <p:cNvPr id="2" name="Flussdiagramm: Verbinder 1">
             <a:extLst>
               <a:ext uri="{FF2B5EF4-FFF2-40B4-BE49-F238E27FC236}">
@@ -5297,6 +7212,129 @@
 </p:sld>
 </file>
 
+<file path=ppt/slides/slide20.xml><?xml version="1.0" encoding="utf-8"?>
+<p:sld xmlns:a="http://schemas.openxmlformats.org/drawingml/2006/main" xmlns:r="http://schemas.openxmlformats.org/officeDocument/2006/relationships" xmlns:p="http://schemas.openxmlformats.org/presentationml/2006/main">
+  <p:cSld>
+    <p:spTree>
+      <p:nvGrpSpPr>
+        <p:cNvPr id="1" name=""/>
+        <p:cNvGrpSpPr/>
+        <p:nvPr/>
+      </p:nvGrpSpPr>
+      <p:grpSpPr>
+        <a:xfrm>
+          <a:off x="0" y="0"/>
+          <a:ext cx="0" cy="0"/>
+          <a:chOff x="0" y="0"/>
+          <a:chExt cx="0" cy="0"/>
+        </a:xfrm>
+      </p:grpSpPr>
+      <p:sp>
+        <p:nvSpPr>
+          <p:cNvPr id="2" name="Titel 1">
+            <a:extLst>
+              <a:ext uri="{FF2B5EF4-FFF2-40B4-BE49-F238E27FC236}">
+                <a16:creationId xmlns:a16="http://schemas.microsoft.com/office/drawing/2014/main" id="{56A0F7A5-6603-4CDB-B988-4EEB9221E811}"/>
+              </a:ext>
+            </a:extLst>
+          </p:cNvPr>
+          <p:cNvSpPr>
+            <a:spLocks noGrp="1"/>
+          </p:cNvSpPr>
+          <p:nvPr>
+            <p:ph type="title"/>
+          </p:nvPr>
+        </p:nvSpPr>
+        <p:spPr/>
+        <p:txBody>
+          <a:bodyPr/>
+          <a:lstStyle/>
+          <a:p>
+            <a:r>
+              <a:rPr lang="de-DE" dirty="0"/>
+              <a:t>Links</a:t>
+            </a:r>
+          </a:p>
+        </p:txBody>
+      </p:sp>
+      <p:sp>
+        <p:nvSpPr>
+          <p:cNvPr id="3" name="Inhaltsplatzhalter 2">
+            <a:extLst>
+              <a:ext uri="{FF2B5EF4-FFF2-40B4-BE49-F238E27FC236}">
+                <a16:creationId xmlns:a16="http://schemas.microsoft.com/office/drawing/2014/main" id="{B7ED35C3-7671-4326-8451-546FA22C2094}"/>
+              </a:ext>
+            </a:extLst>
+          </p:cNvPr>
+          <p:cNvSpPr>
+            <a:spLocks noGrp="1"/>
+          </p:cNvSpPr>
+          <p:nvPr>
+            <p:ph idx="1"/>
+          </p:nvPr>
+        </p:nvSpPr>
+        <p:spPr/>
+        <p:txBody>
+          <a:bodyPr/>
+          <a:lstStyle/>
+          <a:p>
+            <a:r>
+              <a:rPr lang="de-DE" dirty="0"/>
+              <a:t>[1]: </a:t>
+            </a:r>
+            <a:r>
+              <a:rPr lang="de-DE" dirty="0">
+                <a:hlinkClick r:id="rId2"/>
+              </a:rPr>
+              <a:t>https://www-cs.stanford.edu/~jure/pubs/cesna-icdm13.pdf</a:t>
+            </a:r>
+            <a:endParaRPr lang="de-DE" dirty="0"/>
+          </a:p>
+          <a:p>
+            <a:r>
+              <a:rPr lang="de-DE" dirty="0"/>
+              <a:t>[2]: </a:t>
+            </a:r>
+            <a:r>
+              <a:rPr lang="de-DE" dirty="0">
+                <a:hlinkClick r:id="rId3"/>
+              </a:rPr>
+              <a:t>http://mashuai.buaa.edu.cn/pubs/cikm-demo2016.pdf</a:t>
+            </a:r>
+            <a:r>
+              <a:rPr lang="de-DE" dirty="0"/>
+              <a:t> (</a:t>
+            </a:r>
+            <a:r>
+              <a:rPr lang="de-DE" dirty="0" err="1"/>
+              <a:t>TGraph</a:t>
+            </a:r>
+            <a:r>
+              <a:rPr lang="de-DE" dirty="0"/>
+              <a:t>)</a:t>
+            </a:r>
+          </a:p>
+          <a:p>
+            <a:endParaRPr lang="de-DE" dirty="0"/>
+          </a:p>
+          <a:p>
+            <a:endParaRPr lang="de-DE" dirty="0"/>
+          </a:p>
+        </p:txBody>
+      </p:sp>
+    </p:spTree>
+    <p:extLst>
+      <p:ext uri="{BB962C8B-B14F-4D97-AF65-F5344CB8AC3E}">
+        <p14:creationId xmlns:p14="http://schemas.microsoft.com/office/powerpoint/2010/main" val="937086141"/>
+      </p:ext>
+    </p:extLst>
+  </p:cSld>
+  <p:clrMapOvr>
+    <a:masterClrMapping/>
+  </p:clrMapOvr>
+</p:sld>
+</file>
+
 <file path=ppt/slides/slide3.xml><?xml version="1.0" encoding="utf-8"?>
 <p:sld xmlns:a="http://schemas.openxmlformats.org/drawingml/2006/main" xmlns:r="http://schemas.openxmlformats.org/officeDocument/2006/relationships" xmlns:p="http://schemas.openxmlformats.org/presentationml/2006/main">
   <p:cSld>
@@ -5695,8 +7733,13 @@
           <a:p>
             <a:r>
               <a:rPr lang="de-DE" dirty="0"/>
-              <a:t>Snapshot Technik</a:t>
-            </a:r>
+              <a:t>Snapshot Technik vs. Time </a:t>
+            </a:r>
+            <a:r>
+              <a:rPr lang="de-DE" dirty="0" err="1"/>
+              <a:t>Window</a:t>
+            </a:r>
+            <a:endParaRPr lang="de-DE" dirty="0"/>
           </a:p>
           <a:p>
             <a:r>
@@ -6330,4 +8373,299 @@
     </a:ext>
   </a:extLst>
 </a:theme>
+</file>
+
+<file path=ppt/theme/theme2.xml><?xml version="1.0" encoding="utf-8"?>
+<a:theme xmlns:a="http://schemas.openxmlformats.org/drawingml/2006/main" name="Office">
+  <a:themeElements>
+    <a:clrScheme name="Office">
+      <a:dk1>
+        <a:sysClr val="windowText" lastClr="000000"/>
+      </a:dk1>
+      <a:lt1>
+        <a:sysClr val="window" lastClr="FFFFFF"/>
+      </a:lt1>
+      <a:dk2>
+        <a:srgbClr val="44546A"/>
+      </a:dk2>
+      <a:lt2>
+        <a:srgbClr val="E7E6E6"/>
+      </a:lt2>
+      <a:accent1>
+        <a:srgbClr val="4472C4"/>
+      </a:accent1>
+      <a:accent2>
+        <a:srgbClr val="ED7D31"/>
+      </a:accent2>
+      <a:accent3>
+        <a:srgbClr val="A5A5A5"/>
+      </a:accent3>
+      <a:accent4>
+        <a:srgbClr val="FFC000"/>
+      </a:accent4>
+      <a:accent5>
+        <a:srgbClr val="5B9BD5"/>
+      </a:accent5>
+      <a:accent6>
+        <a:srgbClr val="70AD47"/>
+      </a:accent6>
+      <a:hlink>
+        <a:srgbClr val="0563C1"/>
+      </a:hlink>
+      <a:folHlink>
+        <a:srgbClr val="954F72"/>
+      </a:folHlink>
+    </a:clrScheme>
+    <a:fontScheme name="Office">
+      <a:majorFont>
+        <a:latin typeface="Calibri Light" panose="020F0302020204030204"/>
+        <a:ea typeface=""/>
+        <a:cs typeface=""/>
+        <a:font script="Jpan" typeface="游ゴシック Light"/>
+        <a:font script="Hang" typeface="맑은 고딕"/>
+        <a:font script="Hans" typeface="等线 Light"/>
+        <a:font script="Hant" typeface="新細明體"/>
+        <a:font script="Arab" typeface="Times New Roman"/>
+        <a:font script="Hebr" typeface="Times New Roman"/>
+        <a:font script="Thai" typeface="Angsana New"/>
+        <a:font script="Ethi" typeface="Nyala"/>
+        <a:font script="Beng" typeface="Vrinda"/>
+        <a:font script="Gujr" typeface="Shruti"/>
+        <a:font script="Khmr" typeface="MoolBoran"/>
+        <a:font script="Knda" typeface="Tunga"/>
+        <a:font script="Guru" typeface="Raavi"/>
+        <a:font script="Cans" typeface="Euphemia"/>
+        <a:font script="Cher" typeface="Plantagenet Cherokee"/>
+        <a:font script="Yiii" typeface="Microsoft Yi Baiti"/>
+        <a:font script="Tibt" typeface="Microsoft Himalaya"/>
+        <a:font script="Thaa" typeface="MV Boli"/>
+        <a:font script="Deva" typeface="Mangal"/>
+        <a:font script="Telu" typeface="Gautami"/>
+        <a:font script="Taml" typeface="Latha"/>
+        <a:font script="Syrc" typeface="Estrangelo Edessa"/>
+        <a:font script="Orya" typeface="Kalinga"/>
+        <a:font script="Mlym" typeface="Kartika"/>
+        <a:font script="Laoo" typeface="DokChampa"/>
+        <a:font script="Sinh" typeface="Iskoola Pota"/>
+        <a:font script="Mong" typeface="Mongolian Baiti"/>
+        <a:font script="Viet" typeface="Times New Roman"/>
+        <a:font script="Uigh" typeface="Microsoft Uighur"/>
+        <a:font script="Geor" typeface="Sylfaen"/>
+        <a:font script="Armn" typeface="Arial"/>
+        <a:font script="Bugi" typeface="Leelawadee UI"/>
+        <a:font script="Bopo" typeface="Microsoft JhengHei"/>
+        <a:font script="Java" typeface="Javanese Text"/>
+        <a:font script="Lisu" typeface="Segoe UI"/>
+        <a:font script="Mymr" typeface="Myanmar Text"/>
+        <a:font script="Nkoo" typeface="Ebrima"/>
+        <a:font script="Olck" typeface="Nirmala UI"/>
+        <a:font script="Osma" typeface="Ebrima"/>
+        <a:font script="Phag" typeface="Phagspa"/>
+        <a:font script="Syrn" typeface="Estrangelo Edessa"/>
+        <a:font script="Syrj" typeface="Estrangelo Edessa"/>
+        <a:font script="Syre" typeface="Estrangelo Edessa"/>
+        <a:font script="Sora" typeface="Nirmala UI"/>
+        <a:font script="Tale" typeface="Microsoft Tai Le"/>
+        <a:font script="Talu" typeface="Microsoft New Tai Lue"/>
+        <a:font script="Tfng" typeface="Ebrima"/>
+      </a:majorFont>
+      <a:minorFont>
+        <a:latin typeface="Calibri" panose="020F0502020204030204"/>
+        <a:ea typeface=""/>
+        <a:cs typeface=""/>
+        <a:font script="Jpan" typeface="游ゴシック"/>
+        <a:font script="Hang" typeface="맑은 고딕"/>
+        <a:font script="Hans" typeface="等线"/>
+        <a:font script="Hant" typeface="新細明體"/>
+        <a:font script="Arab" typeface="Arial"/>
+        <a:font script="Hebr" typeface="Arial"/>
+        <a:font script="Thai" typeface="Cordia New"/>
+        <a:font script="Ethi" typeface="Nyala"/>
+        <a:font script="Beng" typeface="Vrinda"/>
+        <a:font script="Gujr" typeface="Shruti"/>
+        <a:font script="Khmr" typeface="DaunPenh"/>
+        <a:font script="Knda" typeface="Tunga"/>
+        <a:font script="Guru" typeface="Raavi"/>
+        <a:font script="Cans" typeface="Euphemia"/>
+        <a:font script="Cher" typeface="Plantagenet Cherokee"/>
+        <a:font script="Yiii" typeface="Microsoft Yi Baiti"/>
+        <a:font script="Tibt" typeface="Microsoft Himalaya"/>
+        <a:font script="Thaa" typeface="MV Boli"/>
+        <a:font script="Deva" typeface="Mangal"/>
+        <a:font script="Telu" typeface="Gautami"/>
+        <a:font script="Taml" typeface="Latha"/>
+        <a:font script="Syrc" typeface="Estrangelo Edessa"/>
+        <a:font script="Orya" typeface="Kalinga"/>
+        <a:font script="Mlym" typeface="Kartika"/>
+        <a:font script="Laoo" typeface="DokChampa"/>
+        <a:font script="Sinh" typeface="Iskoola Pota"/>
+        <a:font script="Mong" typeface="Mongolian Baiti"/>
+        <a:font script="Viet" typeface="Arial"/>
+        <a:font script="Uigh" typeface="Microsoft Uighur"/>
+        <a:font script="Geor" typeface="Sylfaen"/>
+        <a:font script="Armn" typeface="Arial"/>
+        <a:font script="Bugi" typeface="Leelawadee UI"/>
+        <a:font script="Bopo" typeface="Microsoft JhengHei"/>
+        <a:font script="Java" typeface="Javanese Text"/>
+        <a:font script="Lisu" typeface="Segoe UI"/>
+        <a:font script="Mymr" typeface="Myanmar Text"/>
+        <a:font script="Nkoo" typeface="Ebrima"/>
+        <a:font script="Olck" typeface="Nirmala UI"/>
+        <a:font script="Osma" typeface="Ebrima"/>
+        <a:font script="Phag" typeface="Phagspa"/>
+        <a:font script="Syrn" typeface="Estrangelo Edessa"/>
+        <a:font script="Syrj" typeface="Estrangelo Edessa"/>
+        <a:font script="Syre" typeface="Estrangelo Edessa"/>
+        <a:font script="Sora" typeface="Nirmala UI"/>
+        <a:font script="Tale" typeface="Microsoft Tai Le"/>
+        <a:font script="Talu" typeface="Microsoft New Tai Lue"/>
+        <a:font script="Tfng" typeface="Ebrima"/>
+      </a:minorFont>
+    </a:fontScheme>
+    <a:fmtScheme name="Office">
+      <a:fillStyleLst>
+        <a:solidFill>
+          <a:schemeClr val="phClr"/>
+        </a:solidFill>
+        <a:gradFill rotWithShape="1">
+          <a:gsLst>
+            <a:gs pos="0">
+              <a:schemeClr val="phClr">
+                <a:lumMod val="110000"/>
+                <a:satMod val="105000"/>
+                <a:tint val="67000"/>
+              </a:schemeClr>
+            </a:gs>
+            <a:gs pos="50000">
+              <a:schemeClr val="phClr">
+                <a:lumMod val="105000"/>
+                <a:satMod val="103000"/>
+                <a:tint val="73000"/>
+              </a:schemeClr>
+            </a:gs>
+            <a:gs pos="100000">
+              <a:schemeClr val="phClr">
+                <a:lumMod val="105000"/>
+                <a:satMod val="109000"/>
+                <a:tint val="81000"/>
+              </a:schemeClr>
+            </a:gs>
+          </a:gsLst>
+          <a:lin ang="5400000" scaled="0"/>
+        </a:gradFill>
+        <a:gradFill rotWithShape="1">
+          <a:gsLst>
+            <a:gs pos="0">
+              <a:schemeClr val="phClr">
+                <a:satMod val="103000"/>
+                <a:lumMod val="102000"/>
+                <a:tint val="94000"/>
+              </a:schemeClr>
+            </a:gs>
+            <a:gs pos="50000">
+              <a:schemeClr val="phClr">
+                <a:satMod val="110000"/>
+                <a:lumMod val="100000"/>
+                <a:shade val="100000"/>
+              </a:schemeClr>
+            </a:gs>
+            <a:gs pos="100000">
+              <a:schemeClr val="phClr">
+                <a:lumMod val="99000"/>
+                <a:satMod val="120000"/>
+                <a:shade val="78000"/>
+              </a:schemeClr>
+            </a:gs>
+          </a:gsLst>
+          <a:lin ang="5400000" scaled="0"/>
+        </a:gradFill>
+      </a:fillStyleLst>
+      <a:lnStyleLst>
+        <a:ln w="6350" cap="flat" cmpd="sng" algn="ctr">
+          <a:solidFill>
+            <a:schemeClr val="phClr"/>
+          </a:solidFill>
+          <a:prstDash val="solid"/>
+          <a:miter lim="800000"/>
+        </a:ln>
+        <a:ln w="12700" cap="flat" cmpd="sng" algn="ctr">
+          <a:solidFill>
+            <a:schemeClr val="phClr"/>
+          </a:solidFill>
+          <a:prstDash val="solid"/>
+          <a:miter lim="800000"/>
+        </a:ln>
+        <a:ln w="19050" cap="flat" cmpd="sng" algn="ctr">
+          <a:solidFill>
+            <a:schemeClr val="phClr"/>
+          </a:solidFill>
+          <a:prstDash val="solid"/>
+          <a:miter lim="800000"/>
+        </a:ln>
+      </a:lnStyleLst>
+      <a:effectStyleLst>
+        <a:effectStyle>
+          <a:effectLst/>
+        </a:effectStyle>
+        <a:effectStyle>
+          <a:effectLst/>
+        </a:effectStyle>
+        <a:effectStyle>
+          <a:effectLst>
+            <a:outerShdw blurRad="57150" dist="19050" dir="5400000" algn="ctr" rotWithShape="0">
+              <a:srgbClr val="000000">
+                <a:alpha val="63000"/>
+              </a:srgbClr>
+            </a:outerShdw>
+          </a:effectLst>
+        </a:effectStyle>
+      </a:effectStyleLst>
+      <a:bgFillStyleLst>
+        <a:solidFill>
+          <a:schemeClr val="phClr"/>
+        </a:solidFill>
+        <a:solidFill>
+          <a:schemeClr val="phClr">
+            <a:tint val="95000"/>
+            <a:satMod val="170000"/>
+          </a:schemeClr>
+        </a:solidFill>
+        <a:gradFill rotWithShape="1">
+          <a:gsLst>
+            <a:gs pos="0">
+              <a:schemeClr val="phClr">
+                <a:tint val="93000"/>
+                <a:satMod val="150000"/>
+                <a:shade val="98000"/>
+                <a:lumMod val="102000"/>
+              </a:schemeClr>
+            </a:gs>
+            <a:gs pos="50000">
+              <a:schemeClr val="phClr">
+                <a:tint val="98000"/>
+                <a:satMod val="130000"/>
+                <a:shade val="90000"/>
+                <a:lumMod val="103000"/>
+              </a:schemeClr>
+            </a:gs>
+            <a:gs pos="100000">
+              <a:schemeClr val="phClr">
+                <a:shade val="63000"/>
+                <a:satMod val="120000"/>
+              </a:schemeClr>
+            </a:gs>
+          </a:gsLst>
+          <a:lin ang="5400000" scaled="0"/>
+        </a:gradFill>
+      </a:bgFillStyleLst>
+    </a:fmtScheme>
+  </a:themeElements>
+  <a:objectDefaults/>
+  <a:extraClrSchemeLst/>
+  <a:extLst>
+    <a:ext uri="{05A4C25C-085E-4340-85A3-A5531E510DB2}">
+      <thm15:themeFamily xmlns:thm15="http://schemas.microsoft.com/office/thememl/2012/main" name="Office Theme" id="{62F939B6-93AF-4DB8-9C6B-D6C7DFDC589F}" vid="{4A3C46E8-61CC-4603-A589-7422A47A8E4A}"/>
+    </a:ext>
+  </a:extLst>
+</a:theme>
 </file>
</xml_diff>

<commit_message>
Use Cases der Paper zusammengefasst
</commit_message>
<xml_diff>
--- a/Bewertungsmatrix.pptx
+++ b/Bewertungsmatrix.pptx
@@ -219,7 +219,7 @@
           <a:p>
             <a:fld id="{C186884D-CF9C-498C-8F09-CC25657E25A2}" type="datetimeFigureOut">
               <a:rPr lang="de-DE" smtClean="0"/>
-              <a:t>26.06.2018</a:t>
+              <a:t>04.07.2018</a:t>
             </a:fld>
             <a:endParaRPr lang="de-DE"/>
           </a:p>
@@ -1428,6 +1428,213 @@
 </p:notes>
 </file>
 
+<file path=ppt/notesSlides/notesSlide6.xml><?xml version="1.0" encoding="utf-8"?>
+<p:notes xmlns:a="http://schemas.openxmlformats.org/drawingml/2006/main" xmlns:r="http://schemas.openxmlformats.org/officeDocument/2006/relationships" xmlns:p="http://schemas.openxmlformats.org/presentationml/2006/main">
+  <p:cSld>
+    <p:spTree>
+      <p:nvGrpSpPr>
+        <p:cNvPr id="1" name=""/>
+        <p:cNvGrpSpPr/>
+        <p:nvPr/>
+      </p:nvGrpSpPr>
+      <p:grpSpPr>
+        <a:xfrm>
+          <a:off x="0" y="0"/>
+          <a:ext cx="0" cy="0"/>
+          <a:chOff x="0" y="0"/>
+          <a:chExt cx="0" cy="0"/>
+        </a:xfrm>
+      </p:grpSpPr>
+      <p:sp>
+        <p:nvSpPr>
+          <p:cNvPr id="2" name="Folienbildplatzhalter 1"/>
+          <p:cNvSpPr>
+            <a:spLocks noGrp="1" noRot="1" noChangeAspect="1"/>
+          </p:cNvSpPr>
+          <p:nvPr>
+            <p:ph type="sldImg"/>
+          </p:nvPr>
+        </p:nvSpPr>
+        <p:spPr/>
+      </p:sp>
+      <p:sp>
+        <p:nvSpPr>
+          <p:cNvPr id="3" name="Notizenplatzhalter 2"/>
+          <p:cNvSpPr>
+            <a:spLocks noGrp="1"/>
+          </p:cNvSpPr>
+          <p:nvPr>
+            <p:ph type="body" idx="1"/>
+          </p:nvPr>
+        </p:nvSpPr>
+        <p:spPr/>
+        <p:txBody>
+          <a:bodyPr/>
+          <a:lstStyle/>
+          <a:p>
+            <a:r>
+              <a:rPr lang="de-DE" dirty="0"/>
+              <a:t>Fest: über zeit nicht veränderbar</a:t>
+            </a:r>
+          </a:p>
+          <a:p>
+            <a:r>
+              <a:rPr lang="de-DE" dirty="0"/>
+              <a:t>Variabel</a:t>
+            </a:r>
+          </a:p>
+          <a:p>
+            <a:r>
+              <a:rPr lang="de-DE" dirty="0"/>
+              <a:t>Fest und variabel zeitlicher </a:t>
+            </a:r>
+            <a:r>
+              <a:rPr lang="de-DE" dirty="0" err="1"/>
+              <a:t>aspekt</a:t>
+            </a:r>
+            <a:endParaRPr lang="de-DE" dirty="0"/>
+          </a:p>
+          <a:p>
+            <a:r>
+              <a:rPr lang="de-DE" dirty="0"/>
+              <a:t>Berechnet und explizit </a:t>
+            </a:r>
+          </a:p>
+          <a:p>
+            <a:r>
+              <a:rPr lang="de-DE" dirty="0"/>
+              <a:t>Wert einmal gesetzt, dann iterativ bis </a:t>
+            </a:r>
+            <a:r>
+              <a:rPr lang="de-DE" dirty="0" err="1"/>
+              <a:t>einmall</a:t>
+            </a:r>
+            <a:r>
+              <a:rPr lang="de-DE" dirty="0"/>
+              <a:t> errechnet</a:t>
+            </a:r>
+          </a:p>
+          <a:p>
+            <a:r>
+              <a:rPr lang="de-DE" dirty="0"/>
+              <a:t>Speziell und gegebene</a:t>
+            </a:r>
+          </a:p>
+          <a:p>
+            <a:r>
+              <a:rPr lang="de-DE" dirty="0"/>
+              <a:t>Fest kann berechnet werden initial was gegeben, dann aber finaler wert iterativ berechnet</a:t>
+            </a:r>
+          </a:p>
+          <a:p>
+            <a:r>
+              <a:rPr lang="de-DE" dirty="0"/>
+              <a:t>keine </a:t>
+            </a:r>
+            <a:r>
+              <a:rPr lang="de-DE" dirty="0" err="1"/>
+              <a:t>konvergenz</a:t>
+            </a:r>
+            <a:r>
+              <a:rPr lang="de-DE" dirty="0"/>
+              <a:t> </a:t>
+            </a:r>
+            <a:r>
+              <a:rPr lang="de-DE" dirty="0" err="1"/>
+              <a:t>berechnung</a:t>
+            </a:r>
+            <a:endParaRPr lang="de-DE" dirty="0"/>
+          </a:p>
+          <a:p>
+            <a:r>
+              <a:rPr lang="de-DE" dirty="0"/>
+              <a:t>Gelb links suchen wir eigentlich</a:t>
+            </a:r>
+          </a:p>
+          <a:p>
+            <a:r>
+              <a:rPr lang="de-DE" dirty="0"/>
+              <a:t>Lieber ne </a:t>
+            </a:r>
+            <a:r>
+              <a:rPr lang="de-DE" dirty="0" err="1"/>
+              <a:t>matrix</a:t>
+            </a:r>
+            <a:r>
+              <a:rPr lang="de-DE" dirty="0"/>
+              <a:t>, wo </a:t>
+            </a:r>
+            <a:r>
+              <a:rPr lang="de-DE" dirty="0" err="1"/>
+              <a:t>system</a:t>
+            </a:r>
+            <a:r>
+              <a:rPr lang="de-DE" dirty="0"/>
+              <a:t> </a:t>
+            </a:r>
+            <a:r>
+              <a:rPr lang="de-DE" dirty="0" err="1"/>
+              <a:t>hauptsächlih</a:t>
+            </a:r>
+            <a:r>
+              <a:rPr lang="de-DE" dirty="0"/>
+              <a:t>, und </a:t>
+            </a:r>
+            <a:r>
+              <a:rPr lang="de-DE" dirty="0" err="1"/>
+              <a:t>use</a:t>
+            </a:r>
+            <a:r>
+              <a:rPr lang="de-DE" dirty="0"/>
+              <a:t> </a:t>
+            </a:r>
+            <a:r>
+              <a:rPr lang="de-DE" dirty="0" err="1"/>
+              <a:t>case</a:t>
+            </a:r>
+            <a:r>
+              <a:rPr lang="de-DE" dirty="0"/>
+              <a:t> </a:t>
+            </a:r>
+          </a:p>
+        </p:txBody>
+      </p:sp>
+      <p:sp>
+        <p:nvSpPr>
+          <p:cNvPr id="4" name="Foliennummernplatzhalter 3"/>
+          <p:cNvSpPr>
+            <a:spLocks noGrp="1"/>
+          </p:cNvSpPr>
+          <p:nvPr>
+            <p:ph type="sldNum" sz="quarter" idx="10"/>
+          </p:nvPr>
+        </p:nvSpPr>
+        <p:spPr/>
+        <p:txBody>
+          <a:bodyPr/>
+          <a:lstStyle/>
+          <a:p>
+            <a:fld id="{8E2B2159-553F-44D2-A7EA-4585E9EF0B5F}" type="slidenum">
+              <a:rPr lang="de-DE" smtClean="0"/>
+              <a:t>21</a:t>
+            </a:fld>
+            <a:endParaRPr lang="de-DE"/>
+          </a:p>
+        </p:txBody>
+      </p:sp>
+    </p:spTree>
+    <p:extLst>
+      <p:ext uri="{BB962C8B-B14F-4D97-AF65-F5344CB8AC3E}">
+        <p14:creationId xmlns:p14="http://schemas.microsoft.com/office/powerpoint/2010/main" val="1638933346"/>
+      </p:ext>
+    </p:extLst>
+  </p:cSld>
+  <p:clrMapOvr>
+    <a:masterClrMapping/>
+  </p:clrMapOvr>
+</p:notes>
+</file>
+
 <file path=ppt/slideLayouts/slideLayout1.xml><?xml version="1.0" encoding="utf-8"?>
 <p:sldLayout xmlns:a="http://schemas.openxmlformats.org/drawingml/2006/main" xmlns:r="http://schemas.openxmlformats.org/officeDocument/2006/relationships" xmlns:p="http://schemas.openxmlformats.org/presentationml/2006/main" type="title" preserve="1">
   <p:cSld name="Titelfolie">
@@ -1575,7 +1782,7 @@
           <a:p>
             <a:fld id="{AB6B1791-49E8-42BA-A706-CD3267C31A09}" type="datetimeFigureOut">
               <a:rPr lang="de-DE" smtClean="0"/>
-              <a:t>26.06.2018</a:t>
+              <a:t>04.07.2018</a:t>
             </a:fld>
             <a:endParaRPr lang="de-DE"/>
           </a:p>
@@ -1773,7 +1980,7 @@
           <a:p>
             <a:fld id="{AB6B1791-49E8-42BA-A706-CD3267C31A09}" type="datetimeFigureOut">
               <a:rPr lang="de-DE" smtClean="0"/>
-              <a:t>26.06.2018</a:t>
+              <a:t>04.07.2018</a:t>
             </a:fld>
             <a:endParaRPr lang="de-DE"/>
           </a:p>
@@ -1981,7 +2188,7 @@
           <a:p>
             <a:fld id="{AB6B1791-49E8-42BA-A706-CD3267C31A09}" type="datetimeFigureOut">
               <a:rPr lang="de-DE" smtClean="0"/>
-              <a:t>26.06.2018</a:t>
+              <a:t>04.07.2018</a:t>
             </a:fld>
             <a:endParaRPr lang="de-DE"/>
           </a:p>
@@ -2179,7 +2386,7 @@
           <a:p>
             <a:fld id="{AB6B1791-49E8-42BA-A706-CD3267C31A09}" type="datetimeFigureOut">
               <a:rPr lang="de-DE" smtClean="0"/>
-              <a:t>26.06.2018</a:t>
+              <a:t>04.07.2018</a:t>
             </a:fld>
             <a:endParaRPr lang="de-DE"/>
           </a:p>
@@ -2454,7 +2661,7 @@
           <a:p>
             <a:fld id="{AB6B1791-49E8-42BA-A706-CD3267C31A09}" type="datetimeFigureOut">
               <a:rPr lang="de-DE" smtClean="0"/>
-              <a:t>26.06.2018</a:t>
+              <a:t>04.07.2018</a:t>
             </a:fld>
             <a:endParaRPr lang="de-DE"/>
           </a:p>
@@ -2719,7 +2926,7 @@
           <a:p>
             <a:fld id="{AB6B1791-49E8-42BA-A706-CD3267C31A09}" type="datetimeFigureOut">
               <a:rPr lang="de-DE" smtClean="0"/>
-              <a:t>26.06.2018</a:t>
+              <a:t>04.07.2018</a:t>
             </a:fld>
             <a:endParaRPr lang="de-DE"/>
           </a:p>
@@ -3131,7 +3338,7 @@
           <a:p>
             <a:fld id="{AB6B1791-49E8-42BA-A706-CD3267C31A09}" type="datetimeFigureOut">
               <a:rPr lang="de-DE" smtClean="0"/>
-              <a:t>26.06.2018</a:t>
+              <a:t>04.07.2018</a:t>
             </a:fld>
             <a:endParaRPr lang="de-DE"/>
           </a:p>
@@ -3272,7 +3479,7 @@
           <a:p>
             <a:fld id="{AB6B1791-49E8-42BA-A706-CD3267C31A09}" type="datetimeFigureOut">
               <a:rPr lang="de-DE" smtClean="0"/>
-              <a:t>26.06.2018</a:t>
+              <a:t>04.07.2018</a:t>
             </a:fld>
             <a:endParaRPr lang="de-DE"/>
           </a:p>
@@ -3385,7 +3592,7 @@
           <a:p>
             <a:fld id="{AB6B1791-49E8-42BA-A706-CD3267C31A09}" type="datetimeFigureOut">
               <a:rPr lang="de-DE" smtClean="0"/>
-              <a:t>26.06.2018</a:t>
+              <a:t>04.07.2018</a:t>
             </a:fld>
             <a:endParaRPr lang="de-DE"/>
           </a:p>
@@ -3696,7 +3903,7 @@
           <a:p>
             <a:fld id="{AB6B1791-49E8-42BA-A706-CD3267C31A09}" type="datetimeFigureOut">
               <a:rPr lang="de-DE" smtClean="0"/>
-              <a:t>26.06.2018</a:t>
+              <a:t>04.07.2018</a:t>
             </a:fld>
             <a:endParaRPr lang="de-DE"/>
           </a:p>
@@ -3984,7 +4191,7 @@
           <a:p>
             <a:fld id="{AB6B1791-49E8-42BA-A706-CD3267C31A09}" type="datetimeFigureOut">
               <a:rPr lang="de-DE" smtClean="0"/>
-              <a:t>26.06.2018</a:t>
+              <a:t>04.07.2018</a:t>
             </a:fld>
             <a:endParaRPr lang="de-DE"/>
           </a:p>
@@ -4225,7 +4432,7 @@
           <a:p>
             <a:fld id="{AB6B1791-49E8-42BA-A706-CD3267C31A09}" type="datetimeFigureOut">
               <a:rPr lang="de-DE" smtClean="0"/>
-              <a:t>26.06.2018</a:t>
+              <a:t>04.07.2018</a:t>
             </a:fld>
             <a:endParaRPr lang="de-DE"/>
           </a:p>

</xml_diff>